<commit_message>
mainly edits to Test/javascript-ks-master
</commit_message>
<xml_diff>
--- a/Figures and settings.pptx
+++ b/Figures and settings.pptx
@@ -139,13 +139,109 @@
 <file path=ppt/revisionInfo.xml><?xml version="1.0" encoding="utf-8"?>
 <p1510:revInfo xmlns:a="http://schemas.openxmlformats.org/drawingml/2006/main" xmlns:r="http://schemas.openxmlformats.org/officeDocument/2006/relationships" xmlns:p1510="http://schemas.microsoft.com/office/powerpoint/2015/10/main">
   <p1510:revLst>
-    <p1510:client id="{D788B803-6CAF-456E-9D5B-399D0D7F1309}" v="58" dt="2025-04-02T15:02:26.278"/>
+    <p1510:client id="{2DD4C6F9-B693-482E-B1B8-D61335F4EE17}" v="1" dt="2025-07-23T10:21:46.483"/>
   </p1510:revLst>
 </p1510:revInfo>
 </file>
 
 <file path=ppt/changesInfos/changesInfo1.xml><?xml version="1.0" encoding="utf-8"?>
 <pc:chgInfo xmlns:a="http://schemas.openxmlformats.org/drawingml/2006/main" xmlns:r="http://schemas.openxmlformats.org/officeDocument/2006/relationships" xmlns:ac="http://schemas.microsoft.com/office/drawing/2013/main/command" xmlns:pc="http://schemas.microsoft.com/office/powerpoint/2013/main/command">
+  <pc:docChgLst>
+    <pc:chgData name="Joshua Reiss" userId="71f87c30-4769-4a42-a082-a6a82298c8cb" providerId="ADAL" clId="{2DD4C6F9-B693-482E-B1B8-D61335F4EE17}"/>
+    <pc:docChg chg="modSld">
+      <pc:chgData name="Joshua Reiss" userId="71f87c30-4769-4a42-a082-a6a82298c8cb" providerId="ADAL" clId="{2DD4C6F9-B693-482E-B1B8-D61335F4EE17}" dt="2025-07-23T10:21:46.483" v="0" actId="164"/>
+      <pc:docMkLst>
+        <pc:docMk/>
+      </pc:docMkLst>
+      <pc:sldChg chg="addSp modSp">
+        <pc:chgData name="Joshua Reiss" userId="71f87c30-4769-4a42-a082-a6a82298c8cb" providerId="ADAL" clId="{2DD4C6F9-B693-482E-B1B8-D61335F4EE17}" dt="2025-07-23T10:21:46.483" v="0" actId="164"/>
+        <pc:sldMkLst>
+          <pc:docMk/>
+          <pc:sldMk cId="4287236545" sldId="352"/>
+        </pc:sldMkLst>
+        <pc:spChg chg="mod">
+          <ac:chgData name="Joshua Reiss" userId="71f87c30-4769-4a42-a082-a6a82298c8cb" providerId="ADAL" clId="{2DD4C6F9-B693-482E-B1B8-D61335F4EE17}" dt="2025-07-23T10:21:46.483" v="0" actId="164"/>
+          <ac:spMkLst>
+            <pc:docMk/>
+            <pc:sldMk cId="4287236545" sldId="352"/>
+            <ac:spMk id="8" creationId="{1A76E437-7554-4B56-C4E2-BB3C0E4AEA31}"/>
+          </ac:spMkLst>
+        </pc:spChg>
+        <pc:spChg chg="mod">
+          <ac:chgData name="Joshua Reiss" userId="71f87c30-4769-4a42-a082-a6a82298c8cb" providerId="ADAL" clId="{2DD4C6F9-B693-482E-B1B8-D61335F4EE17}" dt="2025-07-23T10:21:46.483" v="0" actId="164"/>
+          <ac:spMkLst>
+            <pc:docMk/>
+            <pc:sldMk cId="4287236545" sldId="352"/>
+            <ac:spMk id="9" creationId="{7D6EC9BA-C03E-26D1-FAD2-EAF6500A119B}"/>
+          </ac:spMkLst>
+        </pc:spChg>
+        <pc:spChg chg="mod">
+          <ac:chgData name="Joshua Reiss" userId="71f87c30-4769-4a42-a082-a6a82298c8cb" providerId="ADAL" clId="{2DD4C6F9-B693-482E-B1B8-D61335F4EE17}" dt="2025-07-23T10:21:46.483" v="0" actId="164"/>
+          <ac:spMkLst>
+            <pc:docMk/>
+            <pc:sldMk cId="4287236545" sldId="352"/>
+            <ac:spMk id="10" creationId="{B5081D72-5F55-AF7E-6F70-312422E679C4}"/>
+          </ac:spMkLst>
+        </pc:spChg>
+        <pc:spChg chg="mod">
+          <ac:chgData name="Joshua Reiss" userId="71f87c30-4769-4a42-a082-a6a82298c8cb" providerId="ADAL" clId="{2DD4C6F9-B693-482E-B1B8-D61335F4EE17}" dt="2025-07-23T10:21:46.483" v="0" actId="164"/>
+          <ac:spMkLst>
+            <pc:docMk/>
+            <pc:sldMk cId="4287236545" sldId="352"/>
+            <ac:spMk id="11" creationId="{02F4F030-6317-C08E-2981-31F49999B6D7}"/>
+          </ac:spMkLst>
+        </pc:spChg>
+        <pc:spChg chg="mod">
+          <ac:chgData name="Joshua Reiss" userId="71f87c30-4769-4a42-a082-a6a82298c8cb" providerId="ADAL" clId="{2DD4C6F9-B693-482E-B1B8-D61335F4EE17}" dt="2025-07-23T10:21:46.483" v="0" actId="164"/>
+          <ac:spMkLst>
+            <pc:docMk/>
+            <pc:sldMk cId="4287236545" sldId="352"/>
+            <ac:spMk id="16" creationId="{FEA53039-A3DB-31C0-15B9-B21868D43CCD}"/>
+          </ac:spMkLst>
+        </pc:spChg>
+        <pc:spChg chg="mod">
+          <ac:chgData name="Joshua Reiss" userId="71f87c30-4769-4a42-a082-a6a82298c8cb" providerId="ADAL" clId="{2DD4C6F9-B693-482E-B1B8-D61335F4EE17}" dt="2025-07-23T10:21:46.483" v="0" actId="164"/>
+          <ac:spMkLst>
+            <pc:docMk/>
+            <pc:sldMk cId="4287236545" sldId="352"/>
+            <ac:spMk id="19" creationId="{875DE4CB-A6E6-1D25-07A1-06577C926098}"/>
+          </ac:spMkLst>
+        </pc:spChg>
+        <pc:spChg chg="mod">
+          <ac:chgData name="Joshua Reiss" userId="71f87c30-4769-4a42-a082-a6a82298c8cb" providerId="ADAL" clId="{2DD4C6F9-B693-482E-B1B8-D61335F4EE17}" dt="2025-07-23T10:21:46.483" v="0" actId="164"/>
+          <ac:spMkLst>
+            <pc:docMk/>
+            <pc:sldMk cId="4287236545" sldId="352"/>
+            <ac:spMk id="22" creationId="{F0258842-9D83-3B98-6325-83CFFD82DFFC}"/>
+          </ac:spMkLst>
+        </pc:spChg>
+        <pc:grpChg chg="add mod">
+          <ac:chgData name="Joshua Reiss" userId="71f87c30-4769-4a42-a082-a6a82298c8cb" providerId="ADAL" clId="{2DD4C6F9-B693-482E-B1B8-D61335F4EE17}" dt="2025-07-23T10:21:46.483" v="0" actId="164"/>
+          <ac:grpSpMkLst>
+            <pc:docMk/>
+            <pc:sldMk cId="4287236545" sldId="352"/>
+            <ac:grpSpMk id="3" creationId="{8D9C7F2E-0DEE-BB09-7413-0E917DC97552}"/>
+          </ac:grpSpMkLst>
+        </pc:grpChg>
+        <pc:cxnChg chg="mod">
+          <ac:chgData name="Joshua Reiss" userId="71f87c30-4769-4a42-a082-a6a82298c8cb" providerId="ADAL" clId="{2DD4C6F9-B693-482E-B1B8-D61335F4EE17}" dt="2025-07-23T10:21:46.483" v="0" actId="164"/>
+          <ac:cxnSpMkLst>
+            <pc:docMk/>
+            <pc:sldMk cId="4287236545" sldId="352"/>
+            <ac:cxnSpMk id="15" creationId="{53D14D3D-1A10-DEA6-230D-5D42A8C50CD6}"/>
+          </ac:cxnSpMkLst>
+        </pc:cxnChg>
+        <pc:cxnChg chg="mod">
+          <ac:chgData name="Joshua Reiss" userId="71f87c30-4769-4a42-a082-a6a82298c8cb" providerId="ADAL" clId="{2DD4C6F9-B693-482E-B1B8-D61335F4EE17}" dt="2025-07-23T10:21:46.483" v="0" actId="164"/>
+          <ac:cxnSpMkLst>
+            <pc:docMk/>
+            <pc:sldMk cId="4287236545" sldId="352"/>
+            <ac:cxnSpMk id="23" creationId="{106AF0D4-0CD4-4EBB-E52E-C99FEA52B677}"/>
+          </ac:cxnSpMkLst>
+        </pc:cxnChg>
+      </pc:sldChg>
+    </pc:docChg>
+  </pc:docChgLst>
   <pc:docChgLst>
     <pc:chgData name="Joshua Reiss" userId="71f87c30-4769-4a42-a082-a6a82298c8cb" providerId="ADAL" clId="{D788B803-6CAF-456E-9D5B-399D0D7F1309}"/>
     <pc:docChg chg="undo custSel addSld delSld modSld">
@@ -159,14 +255,6 @@
           <pc:docMk/>
           <pc:sldMk cId="1710399065" sldId="272"/>
         </pc:sldMkLst>
-        <pc:graphicFrameChg chg="mod">
-          <ac:chgData name="Joshua Reiss" userId="71f87c30-4769-4a42-a082-a6a82298c8cb" providerId="ADAL" clId="{D788B803-6CAF-456E-9D5B-399D0D7F1309}" dt="2025-03-13T14:44:17.415" v="200" actId="5736"/>
-          <ac:graphicFrameMkLst>
-            <pc:docMk/>
-            <pc:sldMk cId="1710399065" sldId="272"/>
-            <ac:graphicFrameMk id="5" creationId="{B5ABB3D7-57F0-4766-B49F-6DA1802B5D1B}"/>
-          </ac:graphicFrameMkLst>
-        </pc:graphicFrameChg>
       </pc:sldChg>
       <pc:sldChg chg="add">
         <pc:chgData name="Joshua Reiss" userId="71f87c30-4769-4a42-a082-a6a82298c8cb" providerId="ADAL" clId="{D788B803-6CAF-456E-9D5B-399D0D7F1309}" dt="2025-03-13T13:04:18.144" v="199"/>
@@ -209,86 +297,6 @@
           <pc:docMk/>
           <pc:sldMk cId="1068395398" sldId="351"/>
         </pc:sldMkLst>
-        <pc:spChg chg="mod">
-          <ac:chgData name="Joshua Reiss" userId="71f87c30-4769-4a42-a082-a6a82298c8cb" providerId="ADAL" clId="{D788B803-6CAF-456E-9D5B-399D0D7F1309}" dt="2025-03-13T20:53:53.421" v="209" actId="1036"/>
-          <ac:spMkLst>
-            <pc:docMk/>
-            <pc:sldMk cId="1068395398" sldId="351"/>
-            <ac:spMk id="8" creationId="{61E249BF-AFF2-0D4A-65D5-7E7749D9131B}"/>
-          </ac:spMkLst>
-        </pc:spChg>
-        <pc:spChg chg="mod">
-          <ac:chgData name="Joshua Reiss" userId="71f87c30-4769-4a42-a082-a6a82298c8cb" providerId="ADAL" clId="{D788B803-6CAF-456E-9D5B-399D0D7F1309}" dt="2025-03-13T20:51:35.182" v="207" actId="1036"/>
-          <ac:spMkLst>
-            <pc:docMk/>
-            <pc:sldMk cId="1068395398" sldId="351"/>
-            <ac:spMk id="9" creationId="{35CF4F59-CBB9-A917-8E9C-1FA1FD4BCA78}"/>
-          </ac:spMkLst>
-        </pc:spChg>
-        <pc:spChg chg="mod">
-          <ac:chgData name="Joshua Reiss" userId="71f87c30-4769-4a42-a082-a6a82298c8cb" providerId="ADAL" clId="{D788B803-6CAF-456E-9D5B-399D0D7F1309}" dt="2025-03-13T20:51:35.182" v="207" actId="1036"/>
-          <ac:spMkLst>
-            <pc:docMk/>
-            <pc:sldMk cId="1068395398" sldId="351"/>
-            <ac:spMk id="10" creationId="{D6065EF3-BEF7-204F-513A-2B1A6279F3BA}"/>
-          </ac:spMkLst>
-        </pc:spChg>
-        <pc:spChg chg="mod">
-          <ac:chgData name="Joshua Reiss" userId="71f87c30-4769-4a42-a082-a6a82298c8cb" providerId="ADAL" clId="{D788B803-6CAF-456E-9D5B-399D0D7F1309}" dt="2025-03-13T20:53:53.421" v="209" actId="1036"/>
-          <ac:spMkLst>
-            <pc:docMk/>
-            <pc:sldMk cId="1068395398" sldId="351"/>
-            <ac:spMk id="11" creationId="{C6AAE93F-1C83-2CB5-0C2E-899629992753}"/>
-          </ac:spMkLst>
-        </pc:spChg>
-        <pc:spChg chg="mod">
-          <ac:chgData name="Joshua Reiss" userId="71f87c30-4769-4a42-a082-a6a82298c8cb" providerId="ADAL" clId="{D788B803-6CAF-456E-9D5B-399D0D7F1309}" dt="2025-03-13T20:53:53.421" v="209" actId="1036"/>
-          <ac:spMkLst>
-            <pc:docMk/>
-            <pc:sldMk cId="1068395398" sldId="351"/>
-            <ac:spMk id="16" creationId="{9E5054A7-E71D-74FC-A5D7-4CA6C933C5A1}"/>
-          </ac:spMkLst>
-        </pc:spChg>
-        <pc:cxnChg chg="mod">
-          <ac:chgData name="Joshua Reiss" userId="71f87c30-4769-4a42-a082-a6a82298c8cb" providerId="ADAL" clId="{D788B803-6CAF-456E-9D5B-399D0D7F1309}" dt="2025-03-13T20:53:53.421" v="209" actId="1036"/>
-          <ac:cxnSpMkLst>
-            <pc:docMk/>
-            <pc:sldMk cId="1068395398" sldId="351"/>
-            <ac:cxnSpMk id="12" creationId="{63EA0B9F-E0EB-8818-D37F-1D5EC1ABE292}"/>
-          </ac:cxnSpMkLst>
-        </pc:cxnChg>
-        <pc:cxnChg chg="mod">
-          <ac:chgData name="Joshua Reiss" userId="71f87c30-4769-4a42-a082-a6a82298c8cb" providerId="ADAL" clId="{D788B803-6CAF-456E-9D5B-399D0D7F1309}" dt="2025-03-13T20:51:35.182" v="207" actId="1036"/>
-          <ac:cxnSpMkLst>
-            <pc:docMk/>
-            <pc:sldMk cId="1068395398" sldId="351"/>
-            <ac:cxnSpMk id="13" creationId="{851087B3-1DFB-F8AA-F6A8-382B27D913C8}"/>
-          </ac:cxnSpMkLst>
-        </pc:cxnChg>
-        <pc:cxnChg chg="mod">
-          <ac:chgData name="Joshua Reiss" userId="71f87c30-4769-4a42-a082-a6a82298c8cb" providerId="ADAL" clId="{D788B803-6CAF-456E-9D5B-399D0D7F1309}" dt="2025-03-13T20:51:35.182" v="207" actId="1036"/>
-          <ac:cxnSpMkLst>
-            <pc:docMk/>
-            <pc:sldMk cId="1068395398" sldId="351"/>
-            <ac:cxnSpMk id="14" creationId="{731EA1CD-F767-9863-5C36-B72AE30571B2}"/>
-          </ac:cxnSpMkLst>
-        </pc:cxnChg>
-        <pc:cxnChg chg="mod">
-          <ac:chgData name="Joshua Reiss" userId="71f87c30-4769-4a42-a082-a6a82298c8cb" providerId="ADAL" clId="{D788B803-6CAF-456E-9D5B-399D0D7F1309}" dt="2025-03-13T20:53:53.421" v="209" actId="1036"/>
-          <ac:cxnSpMkLst>
-            <pc:docMk/>
-            <pc:sldMk cId="1068395398" sldId="351"/>
-            <ac:cxnSpMk id="15" creationId="{27DDFB27-C24A-D139-68FE-CC4B4360B9AA}"/>
-          </ac:cxnSpMkLst>
-        </pc:cxnChg>
-        <pc:cxnChg chg="mod">
-          <ac:chgData name="Joshua Reiss" userId="71f87c30-4769-4a42-a082-a6a82298c8cb" providerId="ADAL" clId="{D788B803-6CAF-456E-9D5B-399D0D7F1309}" dt="2025-03-13T20:53:53.421" v="209" actId="1036"/>
-          <ac:cxnSpMkLst>
-            <pc:docMk/>
-            <pc:sldMk cId="1068395398" sldId="351"/>
-            <ac:cxnSpMk id="17" creationId="{4D57AE5B-136B-F08D-491B-E3545A1EF89F}"/>
-          </ac:cxnSpMkLst>
-        </pc:cxnChg>
       </pc:sldChg>
       <pc:sldChg chg="addSp delSp modSp new mod">
         <pc:chgData name="Joshua Reiss" userId="71f87c30-4769-4a42-a082-a6a82298c8cb" providerId="ADAL" clId="{D788B803-6CAF-456E-9D5B-399D0D7F1309}" dt="2025-03-12T13:16:47.584" v="198" actId="207"/>
@@ -296,150 +304,6 @@
           <pc:docMk/>
           <pc:sldMk cId="3176130722" sldId="362"/>
         </pc:sldMkLst>
-        <pc:spChg chg="mod">
-          <ac:chgData name="Joshua Reiss" userId="71f87c30-4769-4a42-a082-a6a82298c8cb" providerId="ADAL" clId="{D788B803-6CAF-456E-9D5B-399D0D7F1309}" dt="2025-03-12T13:13:23.633" v="52" actId="20577"/>
-          <ac:spMkLst>
-            <pc:docMk/>
-            <pc:sldMk cId="3176130722" sldId="362"/>
-            <ac:spMk id="2" creationId="{5120F262-7A2E-CB27-890C-B4B2B2483E21}"/>
-          </ac:spMkLst>
-        </pc:spChg>
-        <pc:spChg chg="add mod">
-          <ac:chgData name="Joshua Reiss" userId="71f87c30-4769-4a42-a082-a6a82298c8cb" providerId="ADAL" clId="{D788B803-6CAF-456E-9D5B-399D0D7F1309}" dt="2025-03-12T13:08:24.907" v="15" actId="20577"/>
-          <ac:spMkLst>
-            <pc:docMk/>
-            <pc:sldMk cId="3176130722" sldId="362"/>
-            <ac:spMk id="4" creationId="{3F846BC9-EFB3-98C5-1EC0-AE9D268CBFC5}"/>
-          </ac:spMkLst>
-        </pc:spChg>
-        <pc:spChg chg="add mod">
-          <ac:chgData name="Joshua Reiss" userId="71f87c30-4769-4a42-a082-a6a82298c8cb" providerId="ADAL" clId="{D788B803-6CAF-456E-9D5B-399D0D7F1309}" dt="2025-03-12T13:08:18.574" v="5"/>
-          <ac:spMkLst>
-            <pc:docMk/>
-            <pc:sldMk cId="3176130722" sldId="362"/>
-            <ac:spMk id="6" creationId="{D8A29253-740B-C0CC-7814-A95752B53C97}"/>
-          </ac:spMkLst>
-        </pc:spChg>
-        <pc:spChg chg="add mod">
-          <ac:chgData name="Joshua Reiss" userId="71f87c30-4769-4a42-a082-a6a82298c8cb" providerId="ADAL" clId="{D788B803-6CAF-456E-9D5B-399D0D7F1309}" dt="2025-03-12T13:14:15.253" v="125" actId="1037"/>
-          <ac:spMkLst>
-            <pc:docMk/>
-            <pc:sldMk cId="3176130722" sldId="362"/>
-            <ac:spMk id="7" creationId="{433D80D1-16F4-FC89-CCA7-62588BC5C68F}"/>
-          </ac:spMkLst>
-        </pc:spChg>
-        <pc:spChg chg="add mod">
-          <ac:chgData name="Joshua Reiss" userId="71f87c30-4769-4a42-a082-a6a82298c8cb" providerId="ADAL" clId="{D788B803-6CAF-456E-9D5B-399D0D7F1309}" dt="2025-03-12T13:08:18.574" v="5"/>
-          <ac:spMkLst>
-            <pc:docMk/>
-            <pc:sldMk cId="3176130722" sldId="362"/>
-            <ac:spMk id="12" creationId="{52F90E31-3D83-AAB9-76EC-A3A3A0DC8D66}"/>
-          </ac:spMkLst>
-        </pc:spChg>
-        <pc:spChg chg="add mod">
-          <ac:chgData name="Joshua Reiss" userId="71f87c30-4769-4a42-a082-a6a82298c8cb" providerId="ADAL" clId="{D788B803-6CAF-456E-9D5B-399D0D7F1309}" dt="2025-03-12T13:08:28.973" v="16" actId="20577"/>
-          <ac:spMkLst>
-            <pc:docMk/>
-            <pc:sldMk cId="3176130722" sldId="362"/>
-            <ac:spMk id="14" creationId="{0C7ADD34-2607-0525-4CE5-8D48E3FF3A6E}"/>
-          </ac:spMkLst>
-        </pc:spChg>
-        <pc:spChg chg="add mod">
-          <ac:chgData name="Joshua Reiss" userId="71f87c30-4769-4a42-a082-a6a82298c8cb" providerId="ADAL" clId="{D788B803-6CAF-456E-9D5B-399D0D7F1309}" dt="2025-03-12T13:14:00.006" v="90" actId="1038"/>
-          <ac:spMkLst>
-            <pc:docMk/>
-            <pc:sldMk cId="3176130722" sldId="362"/>
-            <ac:spMk id="16" creationId="{7A014B07-D770-F62D-52B0-0A233060167C}"/>
-          </ac:spMkLst>
-        </pc:spChg>
-        <pc:spChg chg="add mod">
-          <ac:chgData name="Joshua Reiss" userId="71f87c30-4769-4a42-a082-a6a82298c8cb" providerId="ADAL" clId="{D788B803-6CAF-456E-9D5B-399D0D7F1309}" dt="2025-03-12T13:16:05.406" v="176" actId="1035"/>
-          <ac:spMkLst>
-            <pc:docMk/>
-            <pc:sldMk cId="3176130722" sldId="362"/>
-            <ac:spMk id="20" creationId="{C81B9FC7-1020-C2CA-6424-B66FD5C36364}"/>
-          </ac:spMkLst>
-        </pc:spChg>
-        <pc:spChg chg="add mod">
-          <ac:chgData name="Joshua Reiss" userId="71f87c30-4769-4a42-a082-a6a82298c8cb" providerId="ADAL" clId="{D788B803-6CAF-456E-9D5B-399D0D7F1309}" dt="2025-03-12T13:16:47.584" v="198" actId="207"/>
-          <ac:spMkLst>
-            <pc:docMk/>
-            <pc:sldMk cId="3176130722" sldId="362"/>
-            <ac:spMk id="21" creationId="{02AEF672-FD85-2390-0514-6C60008062CC}"/>
-          </ac:spMkLst>
-        </pc:spChg>
-        <pc:spChg chg="add mod">
-          <ac:chgData name="Joshua Reiss" userId="71f87c30-4769-4a42-a082-a6a82298c8cb" providerId="ADAL" clId="{D788B803-6CAF-456E-9D5B-399D0D7F1309}" dt="2025-03-12T13:16:13.639" v="196" actId="1037"/>
-          <ac:spMkLst>
-            <pc:docMk/>
-            <pc:sldMk cId="3176130722" sldId="362"/>
-            <ac:spMk id="22" creationId="{4D5F2028-8EAF-7477-3891-F280EE312EED}"/>
-          </ac:spMkLst>
-        </pc:spChg>
-        <pc:spChg chg="add mod">
-          <ac:chgData name="Joshua Reiss" userId="71f87c30-4769-4a42-a082-a6a82298c8cb" providerId="ADAL" clId="{D788B803-6CAF-456E-9D5B-399D0D7F1309}" dt="2025-03-12T13:16:05.406" v="176" actId="1035"/>
-          <ac:spMkLst>
-            <pc:docMk/>
-            <pc:sldMk cId="3176130722" sldId="362"/>
-            <ac:spMk id="29" creationId="{8EC90D21-11C0-502E-32CF-9C0032B39F3B}"/>
-          </ac:spMkLst>
-        </pc:spChg>
-        <pc:cxnChg chg="add mod">
-          <ac:chgData name="Joshua Reiss" userId="71f87c30-4769-4a42-a082-a6a82298c8cb" providerId="ADAL" clId="{D788B803-6CAF-456E-9D5B-399D0D7F1309}" dt="2025-03-12T13:08:18.574" v="5"/>
-          <ac:cxnSpMkLst>
-            <pc:docMk/>
-            <pc:sldMk cId="3176130722" sldId="362"/>
-            <ac:cxnSpMk id="8" creationId="{2F6EE011-B9CC-0173-0233-D54C431D3434}"/>
-          </ac:cxnSpMkLst>
-        </pc:cxnChg>
-        <pc:cxnChg chg="add mod">
-          <ac:chgData name="Joshua Reiss" userId="71f87c30-4769-4a42-a082-a6a82298c8cb" providerId="ADAL" clId="{D788B803-6CAF-456E-9D5B-399D0D7F1309}" dt="2025-03-12T13:14:06.142" v="91" actId="14100"/>
-          <ac:cxnSpMkLst>
-            <pc:docMk/>
-            <pc:sldMk cId="3176130722" sldId="362"/>
-            <ac:cxnSpMk id="9" creationId="{FFC36A61-7079-C397-7022-FA7FDD56CA6E}"/>
-          </ac:cxnSpMkLst>
-        </pc:cxnChg>
-        <pc:cxnChg chg="mod">
-          <ac:chgData name="Joshua Reiss" userId="71f87c30-4769-4a42-a082-a6a82298c8cb" providerId="ADAL" clId="{D788B803-6CAF-456E-9D5B-399D0D7F1309}" dt="2025-03-12T13:14:00.006" v="90" actId="1038"/>
-          <ac:cxnSpMkLst>
-            <pc:docMk/>
-            <pc:sldMk cId="3176130722" sldId="362"/>
-            <ac:cxnSpMk id="10" creationId="{BD85C650-5466-D425-6E33-6824E7A3F418}"/>
-          </ac:cxnSpMkLst>
-        </pc:cxnChg>
-        <pc:cxnChg chg="mod">
-          <ac:chgData name="Joshua Reiss" userId="71f87c30-4769-4a42-a082-a6a82298c8cb" providerId="ADAL" clId="{D788B803-6CAF-456E-9D5B-399D0D7F1309}" dt="2025-03-12T13:14:15.253" v="125" actId="1037"/>
-          <ac:cxnSpMkLst>
-            <pc:docMk/>
-            <pc:sldMk cId="3176130722" sldId="362"/>
-            <ac:cxnSpMk id="13" creationId="{6456C4B5-9423-DB9C-C80B-1725F63772E3}"/>
-          </ac:cxnSpMkLst>
-        </pc:cxnChg>
-        <pc:cxnChg chg="add mod">
-          <ac:chgData name="Joshua Reiss" userId="71f87c30-4769-4a42-a082-a6a82298c8cb" providerId="ADAL" clId="{D788B803-6CAF-456E-9D5B-399D0D7F1309}" dt="2025-03-12T13:16:05.406" v="176" actId="1035"/>
-          <ac:cxnSpMkLst>
-            <pc:docMk/>
-            <pc:sldMk cId="3176130722" sldId="362"/>
-            <ac:cxnSpMk id="23" creationId="{87F928E8-0406-2D64-F73D-048E00F53311}"/>
-          </ac:cxnSpMkLst>
-        </pc:cxnChg>
-        <pc:cxnChg chg="add mod">
-          <ac:chgData name="Joshua Reiss" userId="71f87c30-4769-4a42-a082-a6a82298c8cb" providerId="ADAL" clId="{D788B803-6CAF-456E-9D5B-399D0D7F1309}" dt="2025-03-12T13:16:13.639" v="196" actId="1037"/>
-          <ac:cxnSpMkLst>
-            <pc:docMk/>
-            <pc:sldMk cId="3176130722" sldId="362"/>
-            <ac:cxnSpMk id="28" creationId="{67DEB344-C7A0-3703-5133-C3B9ADA17950}"/>
-          </ac:cxnSpMkLst>
-        </pc:cxnChg>
-        <pc:cxnChg chg="mod">
-          <ac:chgData name="Joshua Reiss" userId="71f87c30-4769-4a42-a082-a6a82298c8cb" providerId="ADAL" clId="{D788B803-6CAF-456E-9D5B-399D0D7F1309}" dt="2025-03-12T13:16:05.406" v="176" actId="1035"/>
-          <ac:cxnSpMkLst>
-            <pc:docMk/>
-            <pc:sldMk cId="3176130722" sldId="362"/>
-            <ac:cxnSpMk id="30" creationId="{F5D85A68-1897-CC45-3E7F-9B830179919A}"/>
-          </ac:cxnSpMkLst>
-        </pc:cxnChg>
       </pc:sldChg>
       <pc:sldChg chg="add">
         <pc:chgData name="Joshua Reiss" userId="71f87c30-4769-4a42-a082-a6a82298c8cb" providerId="ADAL" clId="{D788B803-6CAF-456E-9D5B-399D0D7F1309}" dt="2025-03-13T13:04:18.144" v="199"/>
@@ -461,166 +325,6 @@
           <pc:docMk/>
           <pc:sldMk cId="2016982695" sldId="364"/>
         </pc:sldMkLst>
-        <pc:spChg chg="mod">
-          <ac:chgData name="Joshua Reiss" userId="71f87c30-4769-4a42-a082-a6a82298c8cb" providerId="ADAL" clId="{D788B803-6CAF-456E-9D5B-399D0D7F1309}" dt="2025-03-14T21:27:24.245" v="309" actId="20577"/>
-          <ac:spMkLst>
-            <pc:docMk/>
-            <pc:sldMk cId="2016982695" sldId="364"/>
-            <ac:spMk id="2" creationId="{D034348F-6DF2-8642-9212-2E9231430DEA}"/>
-          </ac:spMkLst>
-        </pc:spChg>
-        <pc:spChg chg="mod">
-          <ac:chgData name="Joshua Reiss" userId="71f87c30-4769-4a42-a082-a6a82298c8cb" providerId="ADAL" clId="{D788B803-6CAF-456E-9D5B-399D0D7F1309}" dt="2025-03-14T21:32:13.138" v="384" actId="1035"/>
-          <ac:spMkLst>
-            <pc:docMk/>
-            <pc:sldMk cId="2016982695" sldId="364"/>
-            <ac:spMk id="20" creationId="{759F11DD-39E4-60BD-4FB5-DE7C6C940D2C}"/>
-          </ac:spMkLst>
-        </pc:spChg>
-        <pc:spChg chg="mod">
-          <ac:chgData name="Joshua Reiss" userId="71f87c30-4769-4a42-a082-a6a82298c8cb" providerId="ADAL" clId="{D788B803-6CAF-456E-9D5B-399D0D7F1309}" dt="2025-03-14T21:32:13.138" v="384" actId="1035"/>
-          <ac:spMkLst>
-            <pc:docMk/>
-            <pc:sldMk cId="2016982695" sldId="364"/>
-            <ac:spMk id="22" creationId="{D87457CF-BDFE-C0AE-10F5-9E1F799A88D1}"/>
-          </ac:spMkLst>
-        </pc:spChg>
-        <pc:spChg chg="mod">
-          <ac:chgData name="Joshua Reiss" userId="71f87c30-4769-4a42-a082-a6a82298c8cb" providerId="ADAL" clId="{D788B803-6CAF-456E-9D5B-399D0D7F1309}" dt="2025-03-14T21:32:13.138" v="384" actId="1035"/>
-          <ac:spMkLst>
-            <pc:docMk/>
-            <pc:sldMk cId="2016982695" sldId="364"/>
-            <ac:spMk id="29" creationId="{47A97ACA-38A1-C7E2-62E2-493A36064BF4}"/>
-          </ac:spMkLst>
-        </pc:spChg>
-        <pc:spChg chg="add mod">
-          <ac:chgData name="Joshua Reiss" userId="71f87c30-4769-4a42-a082-a6a82298c8cb" providerId="ADAL" clId="{D788B803-6CAF-456E-9D5B-399D0D7F1309}" dt="2025-03-14T21:34:41.822" v="428" actId="408"/>
-          <ac:spMkLst>
-            <pc:docMk/>
-            <pc:sldMk cId="2016982695" sldId="364"/>
-            <ac:spMk id="38" creationId="{7EE70907-8B22-9CF7-D30A-0C8A1C30FA83}"/>
-          </ac:spMkLst>
-        </pc:spChg>
-        <pc:spChg chg="add mod">
-          <ac:chgData name="Joshua Reiss" userId="71f87c30-4769-4a42-a082-a6a82298c8cb" providerId="ADAL" clId="{D788B803-6CAF-456E-9D5B-399D0D7F1309}" dt="2025-03-14T21:34:20.358" v="423" actId="1038"/>
-          <ac:spMkLst>
-            <pc:docMk/>
-            <pc:sldMk cId="2016982695" sldId="364"/>
-            <ac:spMk id="39" creationId="{C4945762-6788-55DC-250F-50F1B0600BC4}"/>
-          </ac:spMkLst>
-        </pc:spChg>
-        <pc:spChg chg="add mod">
-          <ac:chgData name="Joshua Reiss" userId="71f87c30-4769-4a42-a082-a6a82298c8cb" providerId="ADAL" clId="{D788B803-6CAF-456E-9D5B-399D0D7F1309}" dt="2025-03-14T21:34:41.822" v="428" actId="408"/>
-          <ac:spMkLst>
-            <pc:docMk/>
-            <pc:sldMk cId="2016982695" sldId="364"/>
-            <ac:spMk id="41" creationId="{1A855AA1-B6DB-0ED5-DDFC-8F6EE6ECB45A}"/>
-          </ac:spMkLst>
-        </pc:spChg>
-        <pc:spChg chg="add mod">
-          <ac:chgData name="Joshua Reiss" userId="71f87c30-4769-4a42-a082-a6a82298c8cb" providerId="ADAL" clId="{D788B803-6CAF-456E-9D5B-399D0D7F1309}" dt="2025-03-14T21:37:44.031" v="505" actId="20577"/>
-          <ac:spMkLst>
-            <pc:docMk/>
-            <pc:sldMk cId="2016982695" sldId="364"/>
-            <ac:spMk id="43" creationId="{5CCA9C37-9322-BB6C-C9EC-5A47EC7278BF}"/>
-          </ac:spMkLst>
-        </pc:spChg>
-        <pc:spChg chg="add mod">
-          <ac:chgData name="Joshua Reiss" userId="71f87c30-4769-4a42-a082-a6a82298c8cb" providerId="ADAL" clId="{D788B803-6CAF-456E-9D5B-399D0D7F1309}" dt="2025-03-14T21:36:55.421" v="498" actId="12789"/>
-          <ac:spMkLst>
-            <pc:docMk/>
-            <pc:sldMk cId="2016982695" sldId="364"/>
-            <ac:spMk id="48" creationId="{26AE5D14-08E4-200E-DF59-5A911D4D84D2}"/>
-          </ac:spMkLst>
-        </pc:spChg>
-        <pc:spChg chg="add mod">
-          <ac:chgData name="Joshua Reiss" userId="71f87c30-4769-4a42-a082-a6a82298c8cb" providerId="ADAL" clId="{D788B803-6CAF-456E-9D5B-399D0D7F1309}" dt="2025-03-14T21:36:55.421" v="498" actId="12789"/>
-          <ac:spMkLst>
-            <pc:docMk/>
-            <pc:sldMk cId="2016982695" sldId="364"/>
-            <ac:spMk id="50" creationId="{35FD9770-5011-EA7C-8CB7-0BA5129AD0B9}"/>
-          </ac:spMkLst>
-        </pc:spChg>
-        <pc:spChg chg="add mod">
-          <ac:chgData name="Joshua Reiss" userId="71f87c30-4769-4a42-a082-a6a82298c8cb" providerId="ADAL" clId="{D788B803-6CAF-456E-9D5B-399D0D7F1309}" dt="2025-03-14T21:36:55.421" v="498" actId="12789"/>
-          <ac:spMkLst>
-            <pc:docMk/>
-            <pc:sldMk cId="2016982695" sldId="364"/>
-            <ac:spMk id="51" creationId="{6CA22C11-ABC0-FDF6-02BC-CEEFFEE52954}"/>
-          </ac:spMkLst>
-        </pc:spChg>
-        <pc:spChg chg="add mod">
-          <ac:chgData name="Joshua Reiss" userId="71f87c30-4769-4a42-a082-a6a82298c8cb" providerId="ADAL" clId="{D788B803-6CAF-456E-9D5B-399D0D7F1309}" dt="2025-03-14T21:36:55.421" v="498" actId="12789"/>
-          <ac:spMkLst>
-            <pc:docMk/>
-            <pc:sldMk cId="2016982695" sldId="364"/>
-            <ac:spMk id="52" creationId="{ADC2981D-DC70-A1A3-ACDB-F45BA7429663}"/>
-          </ac:spMkLst>
-        </pc:spChg>
-        <pc:cxnChg chg="mod">
-          <ac:chgData name="Joshua Reiss" userId="71f87c30-4769-4a42-a082-a6a82298c8cb" providerId="ADAL" clId="{D788B803-6CAF-456E-9D5B-399D0D7F1309}" dt="2025-03-14T21:32:13.138" v="384" actId="1035"/>
-          <ac:cxnSpMkLst>
-            <pc:docMk/>
-            <pc:sldMk cId="2016982695" sldId="364"/>
-            <ac:cxnSpMk id="9" creationId="{5B1B22BD-EE07-26A9-1626-C5D31AEC4263}"/>
-          </ac:cxnSpMkLst>
-        </pc:cxnChg>
-        <pc:cxnChg chg="mod">
-          <ac:chgData name="Joshua Reiss" userId="71f87c30-4769-4a42-a082-a6a82298c8cb" providerId="ADAL" clId="{D788B803-6CAF-456E-9D5B-399D0D7F1309}" dt="2025-03-14T21:32:13.138" v="384" actId="1035"/>
-          <ac:cxnSpMkLst>
-            <pc:docMk/>
-            <pc:sldMk cId="2016982695" sldId="364"/>
-            <ac:cxnSpMk id="10" creationId="{CFE5B069-B491-C80D-E38C-74B1903E04AF}"/>
-          </ac:cxnSpMkLst>
-        </pc:cxnChg>
-        <pc:cxnChg chg="mod">
-          <ac:chgData name="Joshua Reiss" userId="71f87c30-4769-4a42-a082-a6a82298c8cb" providerId="ADAL" clId="{D788B803-6CAF-456E-9D5B-399D0D7F1309}" dt="2025-03-14T21:32:13.138" v="384" actId="1035"/>
-          <ac:cxnSpMkLst>
-            <pc:docMk/>
-            <pc:sldMk cId="2016982695" sldId="364"/>
-            <ac:cxnSpMk id="11" creationId="{3DD926BA-C2E2-75B7-15D9-5385F259C092}"/>
-          </ac:cxnSpMkLst>
-        </pc:cxnChg>
-        <pc:cxnChg chg="mod">
-          <ac:chgData name="Joshua Reiss" userId="71f87c30-4769-4a42-a082-a6a82298c8cb" providerId="ADAL" clId="{D788B803-6CAF-456E-9D5B-399D0D7F1309}" dt="2025-03-14T21:32:13.138" v="384" actId="1035"/>
-          <ac:cxnSpMkLst>
-            <pc:docMk/>
-            <pc:sldMk cId="2016982695" sldId="364"/>
-            <ac:cxnSpMk id="23" creationId="{1A82362D-96E9-BF86-589F-A52DF4090677}"/>
-          </ac:cxnSpMkLst>
-        </pc:cxnChg>
-        <pc:cxnChg chg="mod">
-          <ac:chgData name="Joshua Reiss" userId="71f87c30-4769-4a42-a082-a6a82298c8cb" providerId="ADAL" clId="{D788B803-6CAF-456E-9D5B-399D0D7F1309}" dt="2025-03-14T21:32:13.138" v="384" actId="1035"/>
-          <ac:cxnSpMkLst>
-            <pc:docMk/>
-            <pc:sldMk cId="2016982695" sldId="364"/>
-            <ac:cxnSpMk id="30" creationId="{B9D234B3-E1DA-4495-6CB1-9E75AD3F0807}"/>
-          </ac:cxnSpMkLst>
-        </pc:cxnChg>
-        <pc:cxnChg chg="add mod">
-          <ac:chgData name="Joshua Reiss" userId="71f87c30-4769-4a42-a082-a6a82298c8cb" providerId="ADAL" clId="{D788B803-6CAF-456E-9D5B-399D0D7F1309}" dt="2025-03-14T21:34:41.822" v="428" actId="408"/>
-          <ac:cxnSpMkLst>
-            <pc:docMk/>
-            <pc:sldMk cId="2016982695" sldId="364"/>
-            <ac:cxnSpMk id="40" creationId="{AAAFEA93-D691-321D-94FD-4D00C1D9222A}"/>
-          </ac:cxnSpMkLst>
-        </pc:cxnChg>
-        <pc:cxnChg chg="add mod">
-          <ac:chgData name="Joshua Reiss" userId="71f87c30-4769-4a42-a082-a6a82298c8cb" providerId="ADAL" clId="{D788B803-6CAF-456E-9D5B-399D0D7F1309}" dt="2025-03-14T21:34:41.822" v="428" actId="408"/>
-          <ac:cxnSpMkLst>
-            <pc:docMk/>
-            <pc:sldMk cId="2016982695" sldId="364"/>
-            <ac:cxnSpMk id="42" creationId="{50506CAE-6940-8657-E864-A73A31BF327C}"/>
-          </ac:cxnSpMkLst>
-        </pc:cxnChg>
-        <pc:cxnChg chg="add mod">
-          <ac:chgData name="Joshua Reiss" userId="71f87c30-4769-4a42-a082-a6a82298c8cb" providerId="ADAL" clId="{D788B803-6CAF-456E-9D5B-399D0D7F1309}" dt="2025-03-14T21:34:41.822" v="428" actId="408"/>
-          <ac:cxnSpMkLst>
-            <pc:docMk/>
-            <pc:sldMk cId="2016982695" sldId="364"/>
-            <ac:cxnSpMk id="44" creationId="{9AFA8A33-0C12-A731-1F28-FCD4B42D5DEB}"/>
-          </ac:cxnSpMkLst>
-        </pc:cxnChg>
       </pc:sldChg>
       <pc:sldChg chg="addSp delSp modSp add mod">
         <pc:chgData name="Joshua Reiss" userId="71f87c30-4769-4a42-a082-a6a82298c8cb" providerId="ADAL" clId="{D788B803-6CAF-456E-9D5B-399D0D7F1309}" dt="2025-03-22T11:29:57.645" v="1202" actId="1076"/>
@@ -628,334 +332,6 @@
           <pc:docMk/>
           <pc:sldMk cId="201943988" sldId="365"/>
         </pc:sldMkLst>
-        <pc:spChg chg="mod">
-          <ac:chgData name="Joshua Reiss" userId="71f87c30-4769-4a42-a082-a6a82298c8cb" providerId="ADAL" clId="{D788B803-6CAF-456E-9D5B-399D0D7F1309}" dt="2025-03-21T21:07:22.256" v="1188" actId="20577"/>
-          <ac:spMkLst>
-            <pc:docMk/>
-            <pc:sldMk cId="201943988" sldId="365"/>
-            <ac:spMk id="2" creationId="{19464015-D8D5-2B77-0E1C-83BB11C93E83}"/>
-          </ac:spMkLst>
-        </pc:spChg>
-        <pc:spChg chg="add mod">
-          <ac:chgData name="Joshua Reiss" userId="71f87c30-4769-4a42-a082-a6a82298c8cb" providerId="ADAL" clId="{D788B803-6CAF-456E-9D5B-399D0D7F1309}" dt="2025-03-21T21:02:29.227" v="1069" actId="1036"/>
-          <ac:spMkLst>
-            <pc:docMk/>
-            <pc:sldMk cId="201943988" sldId="365"/>
-            <ac:spMk id="4" creationId="{C6D56569-100C-ADC2-A7E1-74243D125AE7}"/>
-          </ac:spMkLst>
-        </pc:spChg>
-        <pc:spChg chg="add mod">
-          <ac:chgData name="Joshua Reiss" userId="71f87c30-4769-4a42-a082-a6a82298c8cb" providerId="ADAL" clId="{D788B803-6CAF-456E-9D5B-399D0D7F1309}" dt="2025-03-21T21:02:29.227" v="1069" actId="1036"/>
-          <ac:spMkLst>
-            <pc:docMk/>
-            <pc:sldMk cId="201943988" sldId="365"/>
-            <ac:spMk id="5" creationId="{400CCFAF-EBFA-2557-E0BE-A3E5502796E4}"/>
-          </ac:spMkLst>
-        </pc:spChg>
-        <pc:spChg chg="add mod">
-          <ac:chgData name="Joshua Reiss" userId="71f87c30-4769-4a42-a082-a6a82298c8cb" providerId="ADAL" clId="{D788B803-6CAF-456E-9D5B-399D0D7F1309}" dt="2025-03-21T21:02:29.227" v="1069" actId="1036"/>
-          <ac:spMkLst>
-            <pc:docMk/>
-            <pc:sldMk cId="201943988" sldId="365"/>
-            <ac:spMk id="6" creationId="{17DE1F7F-476B-6DCE-3411-29C466DAF520}"/>
-          </ac:spMkLst>
-        </pc:spChg>
-        <pc:spChg chg="add mod">
-          <ac:chgData name="Joshua Reiss" userId="71f87c30-4769-4a42-a082-a6a82298c8cb" providerId="ADAL" clId="{D788B803-6CAF-456E-9D5B-399D0D7F1309}" dt="2025-03-21T21:02:41.048" v="1072" actId="1036"/>
-          <ac:spMkLst>
-            <pc:docMk/>
-            <pc:sldMk cId="201943988" sldId="365"/>
-            <ac:spMk id="7" creationId="{FF4EDAAE-AC03-3326-738D-1E538AC31EE0}"/>
-          </ac:spMkLst>
-        </pc:spChg>
-        <pc:spChg chg="add mod">
-          <ac:chgData name="Joshua Reiss" userId="71f87c30-4769-4a42-a082-a6a82298c8cb" providerId="ADAL" clId="{D788B803-6CAF-456E-9D5B-399D0D7F1309}" dt="2025-03-21T21:02:41.048" v="1072" actId="1036"/>
-          <ac:spMkLst>
-            <pc:docMk/>
-            <pc:sldMk cId="201943988" sldId="365"/>
-            <ac:spMk id="8" creationId="{B5E2F2D9-00C2-BB70-4D94-72643DB2ABFD}"/>
-          </ac:spMkLst>
-        </pc:spChg>
-        <pc:spChg chg="add mod">
-          <ac:chgData name="Joshua Reiss" userId="71f87c30-4769-4a42-a082-a6a82298c8cb" providerId="ADAL" clId="{D788B803-6CAF-456E-9D5B-399D0D7F1309}" dt="2025-03-22T11:29:41.355" v="1198" actId="1076"/>
-          <ac:spMkLst>
-            <pc:docMk/>
-            <pc:sldMk cId="201943988" sldId="365"/>
-            <ac:spMk id="9" creationId="{E4D47AB6-259E-8D65-9BFC-D765EE03241F}"/>
-          </ac:spMkLst>
-        </pc:spChg>
-        <pc:spChg chg="add mod">
-          <ac:chgData name="Joshua Reiss" userId="71f87c30-4769-4a42-a082-a6a82298c8cb" providerId="ADAL" clId="{D788B803-6CAF-456E-9D5B-399D0D7F1309}" dt="2025-03-21T21:02:15.527" v="1059" actId="1035"/>
-          <ac:spMkLst>
-            <pc:docMk/>
-            <pc:sldMk cId="201943988" sldId="365"/>
-            <ac:spMk id="10" creationId="{47419154-E448-BA90-CB04-D68AC863E075}"/>
-          </ac:spMkLst>
-        </pc:spChg>
-        <pc:spChg chg="add mod">
-          <ac:chgData name="Joshua Reiss" userId="71f87c30-4769-4a42-a082-a6a82298c8cb" providerId="ADAL" clId="{D788B803-6CAF-456E-9D5B-399D0D7F1309}" dt="2025-03-21T21:02:41.048" v="1072" actId="1036"/>
-          <ac:spMkLst>
-            <pc:docMk/>
-            <pc:sldMk cId="201943988" sldId="365"/>
-            <ac:spMk id="12" creationId="{EE31C4FA-303D-FCEB-C433-04C04CD91825}"/>
-          </ac:spMkLst>
-        </pc:spChg>
-        <pc:spChg chg="add mod">
-          <ac:chgData name="Joshua Reiss" userId="71f87c30-4769-4a42-a082-a6a82298c8cb" providerId="ADAL" clId="{D788B803-6CAF-456E-9D5B-399D0D7F1309}" dt="2025-03-21T21:02:41.048" v="1072" actId="1036"/>
-          <ac:spMkLst>
-            <pc:docMk/>
-            <pc:sldMk cId="201943988" sldId="365"/>
-            <ac:spMk id="13" creationId="{160FC9D7-9472-41A2-2684-C931138CF309}"/>
-          </ac:spMkLst>
-        </pc:spChg>
-        <pc:spChg chg="add mod">
-          <ac:chgData name="Joshua Reiss" userId="71f87c30-4769-4a42-a082-a6a82298c8cb" providerId="ADAL" clId="{D788B803-6CAF-456E-9D5B-399D0D7F1309}" dt="2025-03-21T21:04:32.996" v="1096" actId="554"/>
-          <ac:spMkLst>
-            <pc:docMk/>
-            <pc:sldMk cId="201943988" sldId="365"/>
-            <ac:spMk id="14" creationId="{520B10ED-9E92-A85D-8531-CF5C078C35FD}"/>
-          </ac:spMkLst>
-        </pc:spChg>
-        <pc:spChg chg="add mod">
-          <ac:chgData name="Joshua Reiss" userId="71f87c30-4769-4a42-a082-a6a82298c8cb" providerId="ADAL" clId="{D788B803-6CAF-456E-9D5B-399D0D7F1309}" dt="2025-03-21T21:02:15.527" v="1059" actId="1035"/>
-          <ac:spMkLst>
-            <pc:docMk/>
-            <pc:sldMk cId="201943988" sldId="365"/>
-            <ac:spMk id="15" creationId="{46556121-3091-A273-457A-785253DBCC89}"/>
-          </ac:spMkLst>
-        </pc:spChg>
-        <pc:spChg chg="add mod">
-          <ac:chgData name="Joshua Reiss" userId="71f87c30-4769-4a42-a082-a6a82298c8cb" providerId="ADAL" clId="{D788B803-6CAF-456E-9D5B-399D0D7F1309}" dt="2025-03-21T21:02:15.527" v="1059" actId="1035"/>
-          <ac:spMkLst>
-            <pc:docMk/>
-            <pc:sldMk cId="201943988" sldId="365"/>
-            <ac:spMk id="17" creationId="{BB30476A-8780-021F-8626-B58B0B54A128}"/>
-          </ac:spMkLst>
-        </pc:spChg>
-        <pc:spChg chg="add mod">
-          <ac:chgData name="Joshua Reiss" userId="71f87c30-4769-4a42-a082-a6a82298c8cb" providerId="ADAL" clId="{D788B803-6CAF-456E-9D5B-399D0D7F1309}" dt="2025-03-21T20:57:22.863" v="821" actId="1076"/>
-          <ac:spMkLst>
-            <pc:docMk/>
-            <pc:sldMk cId="201943988" sldId="365"/>
-            <ac:spMk id="20" creationId="{A620637D-3A95-9910-50D4-2236D9EBD0F5}"/>
-          </ac:spMkLst>
-        </pc:spChg>
-        <pc:spChg chg="add mod">
-          <ac:chgData name="Joshua Reiss" userId="71f87c30-4769-4a42-a082-a6a82298c8cb" providerId="ADAL" clId="{D788B803-6CAF-456E-9D5B-399D0D7F1309}" dt="2025-03-22T11:29:49.112" v="1200" actId="1076"/>
-          <ac:spMkLst>
-            <pc:docMk/>
-            <pc:sldMk cId="201943988" sldId="365"/>
-            <ac:spMk id="21" creationId="{E4EDA314-4236-CC58-E672-6DC3766323C1}"/>
-          </ac:spMkLst>
-        </pc:spChg>
-        <pc:spChg chg="add mod">
-          <ac:chgData name="Joshua Reiss" userId="71f87c30-4769-4a42-a082-a6a82298c8cb" providerId="ADAL" clId="{D788B803-6CAF-456E-9D5B-399D0D7F1309}" dt="2025-03-22T11:29:57.645" v="1202" actId="1076"/>
-          <ac:spMkLst>
-            <pc:docMk/>
-            <pc:sldMk cId="201943988" sldId="365"/>
-            <ac:spMk id="22" creationId="{FBC551BE-5FDE-B606-F70C-2207DD7FF17B}"/>
-          </ac:spMkLst>
-        </pc:spChg>
-        <pc:spChg chg="add mod">
-          <ac:chgData name="Joshua Reiss" userId="71f87c30-4769-4a42-a082-a6a82298c8cb" providerId="ADAL" clId="{D788B803-6CAF-456E-9D5B-399D0D7F1309}" dt="2025-03-22T11:29:57.645" v="1202" actId="1076"/>
-          <ac:spMkLst>
-            <pc:docMk/>
-            <pc:sldMk cId="201943988" sldId="365"/>
-            <ac:spMk id="23" creationId="{00131495-11D7-DD35-4D4E-7A6D710D2A17}"/>
-          </ac:spMkLst>
-        </pc:spChg>
-        <pc:spChg chg="add mod">
-          <ac:chgData name="Joshua Reiss" userId="71f87c30-4769-4a42-a082-a6a82298c8cb" providerId="ADAL" clId="{D788B803-6CAF-456E-9D5B-399D0D7F1309}" dt="2025-03-21T20:59:16.990" v="1034" actId="1035"/>
-          <ac:spMkLst>
-            <pc:docMk/>
-            <pc:sldMk cId="201943988" sldId="365"/>
-            <ac:spMk id="35" creationId="{D4523036-458F-0933-63F5-5F63DF797D7B}"/>
-          </ac:spMkLst>
-        </pc:spChg>
-        <pc:spChg chg="mod">
-          <ac:chgData name="Joshua Reiss" userId="71f87c30-4769-4a42-a082-a6a82298c8cb" providerId="ADAL" clId="{D788B803-6CAF-456E-9D5B-399D0D7F1309}" dt="2025-03-21T21:02:29.227" v="1069" actId="1036"/>
-          <ac:spMkLst>
-            <pc:docMk/>
-            <pc:sldMk cId="201943988" sldId="365"/>
-            <ac:spMk id="38" creationId="{CF82A6A8-CC31-16FC-8F5E-4C2A17B27027}"/>
-          </ac:spMkLst>
-        </pc:spChg>
-        <pc:spChg chg="mod">
-          <ac:chgData name="Joshua Reiss" userId="71f87c30-4769-4a42-a082-a6a82298c8cb" providerId="ADAL" clId="{D788B803-6CAF-456E-9D5B-399D0D7F1309}" dt="2025-03-21T21:02:29.227" v="1069" actId="1036"/>
-          <ac:spMkLst>
-            <pc:docMk/>
-            <pc:sldMk cId="201943988" sldId="365"/>
-            <ac:spMk id="41" creationId="{6D08A6AD-B29A-D9B0-8FF6-1CCDB9526AAE}"/>
-          </ac:spMkLst>
-        </pc:spChg>
-        <pc:spChg chg="mod">
-          <ac:chgData name="Joshua Reiss" userId="71f87c30-4769-4a42-a082-a6a82298c8cb" providerId="ADAL" clId="{D788B803-6CAF-456E-9D5B-399D0D7F1309}" dt="2025-03-21T21:02:29.227" v="1069" actId="1036"/>
-          <ac:spMkLst>
-            <pc:docMk/>
-            <pc:sldMk cId="201943988" sldId="365"/>
-            <ac:spMk id="43" creationId="{513C4D83-EC8C-63D7-3E9A-2A442FE6F124}"/>
-          </ac:spMkLst>
-        </pc:spChg>
-        <pc:spChg chg="mod">
-          <ac:chgData name="Joshua Reiss" userId="71f87c30-4769-4a42-a082-a6a82298c8cb" providerId="ADAL" clId="{D788B803-6CAF-456E-9D5B-399D0D7F1309}" dt="2025-03-21T21:02:29.227" v="1069" actId="1036"/>
-          <ac:spMkLst>
-            <pc:docMk/>
-            <pc:sldMk cId="201943988" sldId="365"/>
-            <ac:spMk id="48" creationId="{367825A7-9D17-D7D5-F44A-1BFC67EA98F0}"/>
-          </ac:spMkLst>
-        </pc:spChg>
-        <pc:spChg chg="add mod">
-          <ac:chgData name="Joshua Reiss" userId="71f87c30-4769-4a42-a082-a6a82298c8cb" providerId="ADAL" clId="{D788B803-6CAF-456E-9D5B-399D0D7F1309}" dt="2025-03-21T21:04:32.996" v="1096" actId="554"/>
-          <ac:spMkLst>
-            <pc:docMk/>
-            <pc:sldMk cId="201943988" sldId="365"/>
-            <ac:spMk id="56" creationId="{2FAB1604-B3B9-DFEC-1DA8-684A44624909}"/>
-          </ac:spMkLst>
-        </pc:spChg>
-        <pc:spChg chg="add mod">
-          <ac:chgData name="Joshua Reiss" userId="71f87c30-4769-4a42-a082-a6a82298c8cb" providerId="ADAL" clId="{D788B803-6CAF-456E-9D5B-399D0D7F1309}" dt="2025-03-21T21:04:32.996" v="1096" actId="554"/>
-          <ac:spMkLst>
-            <pc:docMk/>
-            <pc:sldMk cId="201943988" sldId="365"/>
-            <ac:spMk id="57" creationId="{6F432A82-91A7-10DA-3166-55A5E291CD06}"/>
-          </ac:spMkLst>
-        </pc:spChg>
-        <pc:spChg chg="add mod">
-          <ac:chgData name="Joshua Reiss" userId="71f87c30-4769-4a42-a082-a6a82298c8cb" providerId="ADAL" clId="{D788B803-6CAF-456E-9D5B-399D0D7F1309}" dt="2025-03-21T21:04:32.996" v="1096" actId="554"/>
-          <ac:spMkLst>
-            <pc:docMk/>
-            <pc:sldMk cId="201943988" sldId="365"/>
-            <ac:spMk id="58" creationId="{B2D66C22-AD20-DD07-0506-062DE1586D5F}"/>
-          </ac:spMkLst>
-        </pc:spChg>
-        <pc:spChg chg="add mod">
-          <ac:chgData name="Joshua Reiss" userId="71f87c30-4769-4a42-a082-a6a82298c8cb" providerId="ADAL" clId="{D788B803-6CAF-456E-9D5B-399D0D7F1309}" dt="2025-03-21T21:05:31.693" v="1108" actId="114"/>
-          <ac:spMkLst>
-            <pc:docMk/>
-            <pc:sldMk cId="201943988" sldId="365"/>
-            <ac:spMk id="62" creationId="{58BAD77D-3546-387E-C12A-14D6D110A45D}"/>
-          </ac:spMkLst>
-        </pc:spChg>
-        <pc:spChg chg="add mod">
-          <ac:chgData name="Joshua Reiss" userId="71f87c30-4769-4a42-a082-a6a82298c8cb" providerId="ADAL" clId="{D788B803-6CAF-456E-9D5B-399D0D7F1309}" dt="2025-03-21T21:05:46.512" v="1111" actId="20577"/>
-          <ac:spMkLst>
-            <pc:docMk/>
-            <pc:sldMk cId="201943988" sldId="365"/>
-            <ac:spMk id="63" creationId="{660B31A9-8498-EA45-B597-E8D8345ED73F}"/>
-          </ac:spMkLst>
-        </pc:spChg>
-        <pc:cxnChg chg="add mod">
-          <ac:chgData name="Joshua Reiss" userId="71f87c30-4769-4a42-a082-a6a82298c8cb" providerId="ADAL" clId="{D788B803-6CAF-456E-9D5B-399D0D7F1309}" dt="2025-03-21T20:58:07.463" v="867" actId="14100"/>
-          <ac:cxnSpMkLst>
-            <pc:docMk/>
-            <pc:sldMk cId="201943988" sldId="365"/>
-            <ac:cxnSpMk id="3" creationId="{98D88C32-F666-716B-471E-31B54B2934F8}"/>
-          </ac:cxnSpMkLst>
-        </pc:cxnChg>
-        <pc:cxnChg chg="add mod">
-          <ac:chgData name="Joshua Reiss" userId="71f87c30-4769-4a42-a082-a6a82298c8cb" providerId="ADAL" clId="{D788B803-6CAF-456E-9D5B-399D0D7F1309}" dt="2025-03-21T21:02:15.527" v="1059" actId="1035"/>
-          <ac:cxnSpMkLst>
-            <pc:docMk/>
-            <pc:sldMk cId="201943988" sldId="365"/>
-            <ac:cxnSpMk id="11" creationId="{3D922FBF-8951-0827-B503-72F28F0F8E48}"/>
-          </ac:cxnSpMkLst>
-        </pc:cxnChg>
-        <pc:cxnChg chg="add mod">
-          <ac:chgData name="Joshua Reiss" userId="71f87c30-4769-4a42-a082-a6a82298c8cb" providerId="ADAL" clId="{D788B803-6CAF-456E-9D5B-399D0D7F1309}" dt="2025-03-21T21:02:15.527" v="1059" actId="1035"/>
-          <ac:cxnSpMkLst>
-            <pc:docMk/>
-            <pc:sldMk cId="201943988" sldId="365"/>
-            <ac:cxnSpMk id="16" creationId="{10C5A189-FA6F-B83F-E0E9-0332C979F5DA}"/>
-          </ac:cxnSpMkLst>
-        </pc:cxnChg>
-        <pc:cxnChg chg="add mod">
-          <ac:chgData name="Joshua Reiss" userId="71f87c30-4769-4a42-a082-a6a82298c8cb" providerId="ADAL" clId="{D788B803-6CAF-456E-9D5B-399D0D7F1309}" dt="2025-03-21T21:02:15.527" v="1059" actId="1035"/>
-          <ac:cxnSpMkLst>
-            <pc:docMk/>
-            <pc:sldMk cId="201943988" sldId="365"/>
-            <ac:cxnSpMk id="18" creationId="{45CAD3D7-19C7-F53F-ED0B-1BAF8AC542F5}"/>
-          </ac:cxnSpMkLst>
-        </pc:cxnChg>
-        <pc:cxnChg chg="add mod">
-          <ac:chgData name="Joshua Reiss" userId="71f87c30-4769-4a42-a082-a6a82298c8cb" providerId="ADAL" clId="{D788B803-6CAF-456E-9D5B-399D0D7F1309}" dt="2025-03-21T21:02:15.527" v="1059" actId="1035"/>
-          <ac:cxnSpMkLst>
-            <pc:docMk/>
-            <pc:sldMk cId="201943988" sldId="365"/>
-            <ac:cxnSpMk id="19" creationId="{BBFF04E6-AEF2-138A-0F0A-7253A32DD8BE}"/>
-          </ac:cxnSpMkLst>
-        </pc:cxnChg>
-        <pc:cxnChg chg="add mod">
-          <ac:chgData name="Joshua Reiss" userId="71f87c30-4769-4a42-a082-a6a82298c8cb" providerId="ADAL" clId="{D788B803-6CAF-456E-9D5B-399D0D7F1309}" dt="2025-03-21T21:03:00.435" v="1075" actId="14100"/>
-          <ac:cxnSpMkLst>
-            <pc:docMk/>
-            <pc:sldMk cId="201943988" sldId="365"/>
-            <ac:cxnSpMk id="25" creationId="{BF6A71BE-FDC9-DB7A-C91F-8AD63813F2BA}"/>
-          </ac:cxnSpMkLst>
-        </pc:cxnChg>
-        <pc:cxnChg chg="add mod">
-          <ac:chgData name="Joshua Reiss" userId="71f87c30-4769-4a42-a082-a6a82298c8cb" providerId="ADAL" clId="{D788B803-6CAF-456E-9D5B-399D0D7F1309}" dt="2025-03-21T21:03:05.503" v="1076" actId="14100"/>
-          <ac:cxnSpMkLst>
-            <pc:docMk/>
-            <pc:sldMk cId="201943988" sldId="365"/>
-            <ac:cxnSpMk id="31" creationId="{B066A10E-39BE-50B2-20F3-FC3AF9DA8C55}"/>
-          </ac:cxnSpMkLst>
-        </pc:cxnChg>
-        <pc:cxnChg chg="add mod">
-          <ac:chgData name="Joshua Reiss" userId="71f87c30-4769-4a42-a082-a6a82298c8cb" providerId="ADAL" clId="{D788B803-6CAF-456E-9D5B-399D0D7F1309}" dt="2025-03-21T21:02:54.875" v="1074" actId="14100"/>
-          <ac:cxnSpMkLst>
-            <pc:docMk/>
-            <pc:sldMk cId="201943988" sldId="365"/>
-            <ac:cxnSpMk id="36" creationId="{36FFC753-C62B-08D6-C3ED-607CB8CD0ADD}"/>
-          </ac:cxnSpMkLst>
-        </pc:cxnChg>
-        <pc:cxnChg chg="add mod">
-          <ac:chgData name="Joshua Reiss" userId="71f87c30-4769-4a42-a082-a6a82298c8cb" providerId="ADAL" clId="{D788B803-6CAF-456E-9D5B-399D0D7F1309}" dt="2025-03-21T21:02:49.496" v="1073" actId="14100"/>
-          <ac:cxnSpMkLst>
-            <pc:docMk/>
-            <pc:sldMk cId="201943988" sldId="365"/>
-            <ac:cxnSpMk id="37" creationId="{6E17B073-41D7-0945-543B-567A6C7B8910}"/>
-          </ac:cxnSpMkLst>
-        </pc:cxnChg>
-        <pc:cxnChg chg="mod">
-          <ac:chgData name="Joshua Reiss" userId="71f87c30-4769-4a42-a082-a6a82298c8cb" providerId="ADAL" clId="{D788B803-6CAF-456E-9D5B-399D0D7F1309}" dt="2025-03-21T21:02:29.227" v="1069" actId="1036"/>
-          <ac:cxnSpMkLst>
-            <pc:docMk/>
-            <pc:sldMk cId="201943988" sldId="365"/>
-            <ac:cxnSpMk id="40" creationId="{FCF998DF-CA16-C422-0C17-47C9E342CDFE}"/>
-          </ac:cxnSpMkLst>
-        </pc:cxnChg>
-        <pc:cxnChg chg="mod">
-          <ac:chgData name="Joshua Reiss" userId="71f87c30-4769-4a42-a082-a6a82298c8cb" providerId="ADAL" clId="{D788B803-6CAF-456E-9D5B-399D0D7F1309}" dt="2025-03-21T21:02:29.227" v="1069" actId="1036"/>
-          <ac:cxnSpMkLst>
-            <pc:docMk/>
-            <pc:sldMk cId="201943988" sldId="365"/>
-            <ac:cxnSpMk id="42" creationId="{65E92D5E-2F16-05B8-EA6F-669DE5AA931C}"/>
-          </ac:cxnSpMkLst>
-        </pc:cxnChg>
-        <pc:cxnChg chg="add del mod">
-          <ac:chgData name="Joshua Reiss" userId="71f87c30-4769-4a42-a082-a6a82298c8cb" providerId="ADAL" clId="{D788B803-6CAF-456E-9D5B-399D0D7F1309}" dt="2025-03-21T21:02:29.227" v="1069" actId="1036"/>
-          <ac:cxnSpMkLst>
-            <pc:docMk/>
-            <pc:sldMk cId="201943988" sldId="365"/>
-            <ac:cxnSpMk id="44" creationId="{00BB03A3-F7D3-5BCA-0803-2962901C7F74}"/>
-          </ac:cxnSpMkLst>
-        </pc:cxnChg>
-        <pc:cxnChg chg="add mod">
-          <ac:chgData name="Joshua Reiss" userId="71f87c30-4769-4a42-a082-a6a82298c8cb" providerId="ADAL" clId="{D788B803-6CAF-456E-9D5B-399D0D7F1309}" dt="2025-03-21T21:05:59.867" v="1114" actId="14100"/>
-          <ac:cxnSpMkLst>
-            <pc:docMk/>
-            <pc:sldMk cId="201943988" sldId="365"/>
-            <ac:cxnSpMk id="64" creationId="{77651234-306B-D015-D269-34A4079FDE37}"/>
-          </ac:cxnSpMkLst>
-        </pc:cxnChg>
-        <pc:cxnChg chg="add mod">
-          <ac:chgData name="Joshua Reiss" userId="71f87c30-4769-4a42-a082-a6a82298c8cb" providerId="ADAL" clId="{D788B803-6CAF-456E-9D5B-399D0D7F1309}" dt="2025-03-21T21:06:14.654" v="1117" actId="14100"/>
-          <ac:cxnSpMkLst>
-            <pc:docMk/>
-            <pc:sldMk cId="201943988" sldId="365"/>
-            <ac:cxnSpMk id="66" creationId="{AEEAFDC6-38CB-C00C-2621-539AB556C55D}"/>
-          </ac:cxnSpMkLst>
-        </pc:cxnChg>
       </pc:sldChg>
       <pc:sldChg chg="addSp delSp modSp add mod">
         <pc:chgData name="Joshua Reiss" userId="71f87c30-4769-4a42-a082-a6a82298c8cb" providerId="ADAL" clId="{D788B803-6CAF-456E-9D5B-399D0D7F1309}" dt="2025-03-23T09:26:15.203" v="1445" actId="1076"/>
@@ -963,222 +339,6 @@
           <pc:docMk/>
           <pc:sldMk cId="1978429239" sldId="366"/>
         </pc:sldMkLst>
-        <pc:spChg chg="mod">
-          <ac:chgData name="Joshua Reiss" userId="71f87c30-4769-4a42-a082-a6a82298c8cb" providerId="ADAL" clId="{D788B803-6CAF-456E-9D5B-399D0D7F1309}" dt="2025-03-22T11:43:50.430" v="1303" actId="20577"/>
-          <ac:spMkLst>
-            <pc:docMk/>
-            <pc:sldMk cId="1978429239" sldId="366"/>
-            <ac:spMk id="2" creationId="{C9DDDF47-7180-4395-F14B-1DA91C4C5E4A}"/>
-          </ac:spMkLst>
-        </pc:spChg>
-        <pc:spChg chg="add mod">
-          <ac:chgData name="Joshua Reiss" userId="71f87c30-4769-4a42-a082-a6a82298c8cb" providerId="ADAL" clId="{D788B803-6CAF-456E-9D5B-399D0D7F1309}" dt="2025-03-23T09:25:33.375" v="1435" actId="20577"/>
-          <ac:spMkLst>
-            <pc:docMk/>
-            <pc:sldMk cId="1978429239" sldId="366"/>
-            <ac:spMk id="5" creationId="{A5432B07-8421-FBED-DFAD-3733B1D11243}"/>
-          </ac:spMkLst>
-        </pc:spChg>
-        <pc:spChg chg="mod">
-          <ac:chgData name="Joshua Reiss" userId="71f87c30-4769-4a42-a082-a6a82298c8cb" providerId="ADAL" clId="{D788B803-6CAF-456E-9D5B-399D0D7F1309}" dt="2025-03-23T09:24:40.770" v="1423" actId="1036"/>
-          <ac:spMkLst>
-            <pc:docMk/>
-            <pc:sldMk cId="1978429239" sldId="366"/>
-            <ac:spMk id="6" creationId="{8FE89B3F-9D5D-23C2-BA53-7C480857F63A}"/>
-          </ac:spMkLst>
-        </pc:spChg>
-        <pc:spChg chg="mod">
-          <ac:chgData name="Joshua Reiss" userId="71f87c30-4769-4a42-a082-a6a82298c8cb" providerId="ADAL" clId="{D788B803-6CAF-456E-9D5B-399D0D7F1309}" dt="2025-03-23T09:24:40.770" v="1423" actId="1036"/>
-          <ac:spMkLst>
-            <pc:docMk/>
-            <pc:sldMk cId="1978429239" sldId="366"/>
-            <ac:spMk id="7" creationId="{0BBE9DC3-E87E-E9F7-E40D-F74385BE9DBF}"/>
-          </ac:spMkLst>
-        </pc:spChg>
-        <pc:spChg chg="add mod">
-          <ac:chgData name="Joshua Reiss" userId="71f87c30-4769-4a42-a082-a6a82298c8cb" providerId="ADAL" clId="{D788B803-6CAF-456E-9D5B-399D0D7F1309}" dt="2025-03-23T09:24:40.770" v="1423" actId="1036"/>
-          <ac:spMkLst>
-            <pc:docMk/>
-            <pc:sldMk cId="1978429239" sldId="366"/>
-            <ac:spMk id="8" creationId="{F682EE87-2BB5-77F7-9B2C-B96B7FF5A030}"/>
-          </ac:spMkLst>
-        </pc:spChg>
-        <pc:spChg chg="mod">
-          <ac:chgData name="Joshua Reiss" userId="71f87c30-4769-4a42-a082-a6a82298c8cb" providerId="ADAL" clId="{D788B803-6CAF-456E-9D5B-399D0D7F1309}" dt="2025-03-23T09:24:40.770" v="1423" actId="1036"/>
-          <ac:spMkLst>
-            <pc:docMk/>
-            <pc:sldMk cId="1978429239" sldId="366"/>
-            <ac:spMk id="9" creationId="{6DA9F453-E6A0-1C7B-FD4A-3274CCE0FFD7}"/>
-          </ac:spMkLst>
-        </pc:spChg>
-        <pc:spChg chg="add mod">
-          <ac:chgData name="Joshua Reiss" userId="71f87c30-4769-4a42-a082-a6a82298c8cb" providerId="ADAL" clId="{D788B803-6CAF-456E-9D5B-399D0D7F1309}" dt="2025-03-23T09:25:53.099" v="1440" actId="1076"/>
-          <ac:spMkLst>
-            <pc:docMk/>
-            <pc:sldMk cId="1978429239" sldId="366"/>
-            <ac:spMk id="10" creationId="{8446CB5D-9B15-9448-359C-7471991974C7}"/>
-          </ac:spMkLst>
-        </pc:spChg>
-        <pc:spChg chg="add mod">
-          <ac:chgData name="Joshua Reiss" userId="71f87c30-4769-4a42-a082-a6a82298c8cb" providerId="ADAL" clId="{D788B803-6CAF-456E-9D5B-399D0D7F1309}" dt="2025-03-23T09:26:15.203" v="1445" actId="1076"/>
-          <ac:spMkLst>
-            <pc:docMk/>
-            <pc:sldMk cId="1978429239" sldId="366"/>
-            <ac:spMk id="12" creationId="{654AA8ED-BFBD-D87D-DD5B-BE143630DCBC}"/>
-          </ac:spMkLst>
-        </pc:spChg>
-        <pc:spChg chg="mod">
-          <ac:chgData name="Joshua Reiss" userId="71f87c30-4769-4a42-a082-a6a82298c8cb" providerId="ADAL" clId="{D788B803-6CAF-456E-9D5B-399D0D7F1309}" dt="2025-03-23T09:24:40.770" v="1423" actId="1036"/>
-          <ac:spMkLst>
-            <pc:docMk/>
-            <pc:sldMk cId="1978429239" sldId="366"/>
-            <ac:spMk id="13" creationId="{9F0703A4-D0A2-7152-36F0-9407FE01ABBE}"/>
-          </ac:spMkLst>
-        </pc:spChg>
-        <pc:spChg chg="mod">
-          <ac:chgData name="Joshua Reiss" userId="71f87c30-4769-4a42-a082-a6a82298c8cb" providerId="ADAL" clId="{D788B803-6CAF-456E-9D5B-399D0D7F1309}" dt="2025-03-23T09:24:40.770" v="1423" actId="1036"/>
-          <ac:spMkLst>
-            <pc:docMk/>
-            <pc:sldMk cId="1978429239" sldId="366"/>
-            <ac:spMk id="17" creationId="{8C0B4FDB-DED5-49BF-253A-C5FC9140832C}"/>
-          </ac:spMkLst>
-        </pc:spChg>
-        <pc:spChg chg="mod">
-          <ac:chgData name="Joshua Reiss" userId="71f87c30-4769-4a42-a082-a6a82298c8cb" providerId="ADAL" clId="{D788B803-6CAF-456E-9D5B-399D0D7F1309}" dt="2025-03-23T09:24:40.770" v="1423" actId="1036"/>
-          <ac:spMkLst>
-            <pc:docMk/>
-            <pc:sldMk cId="1978429239" sldId="366"/>
-            <ac:spMk id="21" creationId="{95A1F923-60D0-6F7F-3BE8-9F77F5E22D9E}"/>
-          </ac:spMkLst>
-        </pc:spChg>
-        <pc:spChg chg="mod">
-          <ac:chgData name="Joshua Reiss" userId="71f87c30-4769-4a42-a082-a6a82298c8cb" providerId="ADAL" clId="{D788B803-6CAF-456E-9D5B-399D0D7F1309}" dt="2025-03-23T09:24:40.770" v="1423" actId="1036"/>
-          <ac:spMkLst>
-            <pc:docMk/>
-            <pc:sldMk cId="1978429239" sldId="366"/>
-            <ac:spMk id="22" creationId="{0BBD79A9-C9E8-AE09-3E78-F4FCF62DACD9}"/>
-          </ac:spMkLst>
-        </pc:spChg>
-        <pc:spChg chg="mod">
-          <ac:chgData name="Joshua Reiss" userId="71f87c30-4769-4a42-a082-a6a82298c8cb" providerId="ADAL" clId="{D788B803-6CAF-456E-9D5B-399D0D7F1309}" dt="2025-03-23T09:24:40.770" v="1423" actId="1036"/>
-          <ac:spMkLst>
-            <pc:docMk/>
-            <pc:sldMk cId="1978429239" sldId="366"/>
-            <ac:spMk id="23" creationId="{9B3B002D-E4AD-890D-67E1-676BD08636D0}"/>
-          </ac:spMkLst>
-        </pc:spChg>
-        <pc:spChg chg="mod">
-          <ac:chgData name="Joshua Reiss" userId="71f87c30-4769-4a42-a082-a6a82298c8cb" providerId="ADAL" clId="{D788B803-6CAF-456E-9D5B-399D0D7F1309}" dt="2025-03-22T14:29:31.801" v="1381" actId="1038"/>
-          <ac:spMkLst>
-            <pc:docMk/>
-            <pc:sldMk cId="1978429239" sldId="366"/>
-            <ac:spMk id="35" creationId="{0F5EA9BC-2A02-C216-0F4C-1268811AF68C}"/>
-          </ac:spMkLst>
-        </pc:spChg>
-        <pc:spChg chg="mod">
-          <ac:chgData name="Joshua Reiss" userId="71f87c30-4769-4a42-a082-a6a82298c8cb" providerId="ADAL" clId="{D788B803-6CAF-456E-9D5B-399D0D7F1309}" dt="2025-03-22T14:29:19.933" v="1312" actId="1076"/>
-          <ac:spMkLst>
-            <pc:docMk/>
-            <pc:sldMk cId="1978429239" sldId="366"/>
-            <ac:spMk id="43" creationId="{539F9B8A-C2D8-03CE-C44E-ADF9CF139F8E}"/>
-          </ac:spMkLst>
-        </pc:spChg>
-        <pc:spChg chg="mod">
-          <ac:chgData name="Joshua Reiss" userId="71f87c30-4769-4a42-a082-a6a82298c8cb" providerId="ADAL" clId="{D788B803-6CAF-456E-9D5B-399D0D7F1309}" dt="2025-03-23T09:24:40.770" v="1423" actId="1036"/>
-          <ac:spMkLst>
-            <pc:docMk/>
-            <pc:sldMk cId="1978429239" sldId="366"/>
-            <ac:spMk id="48" creationId="{1113F177-676E-7AA8-1040-4CA9FDAB5D17}"/>
-          </ac:spMkLst>
-        </pc:spChg>
-        <pc:spChg chg="mod">
-          <ac:chgData name="Joshua Reiss" userId="71f87c30-4769-4a42-a082-a6a82298c8cb" providerId="ADAL" clId="{D788B803-6CAF-456E-9D5B-399D0D7F1309}" dt="2025-03-22T14:29:31.801" v="1381" actId="1038"/>
-          <ac:spMkLst>
-            <pc:docMk/>
-            <pc:sldMk cId="1978429239" sldId="366"/>
-            <ac:spMk id="58" creationId="{1076C81A-23AE-94FC-5688-D976643E6854}"/>
-          </ac:spMkLst>
-        </pc:spChg>
-        <pc:spChg chg="mod">
-          <ac:chgData name="Joshua Reiss" userId="71f87c30-4769-4a42-a082-a6a82298c8cb" providerId="ADAL" clId="{D788B803-6CAF-456E-9D5B-399D0D7F1309}" dt="2025-03-22T14:30:06.446" v="1384" actId="1076"/>
-          <ac:spMkLst>
-            <pc:docMk/>
-            <pc:sldMk cId="1978429239" sldId="366"/>
-            <ac:spMk id="62" creationId="{DA6599FB-C465-B37A-18E2-AFCB6D982D72}"/>
-          </ac:spMkLst>
-        </pc:spChg>
-        <pc:cxnChg chg="mod">
-          <ac:chgData name="Joshua Reiss" userId="71f87c30-4769-4a42-a082-a6a82298c8cb" providerId="ADAL" clId="{D788B803-6CAF-456E-9D5B-399D0D7F1309}" dt="2025-03-22T14:29:19.933" v="1312" actId="1076"/>
-          <ac:cxnSpMkLst>
-            <pc:docMk/>
-            <pc:sldMk cId="1978429239" sldId="366"/>
-            <ac:cxnSpMk id="3" creationId="{8822B14B-ABC2-A7C1-B2E2-62947AB4E8C0}"/>
-          </ac:cxnSpMkLst>
-        </pc:cxnChg>
-        <pc:cxnChg chg="add mod">
-          <ac:chgData name="Joshua Reiss" userId="71f87c30-4769-4a42-a082-a6a82298c8cb" providerId="ADAL" clId="{D788B803-6CAF-456E-9D5B-399D0D7F1309}" dt="2025-03-23T09:24:35.273" v="1407" actId="1076"/>
-          <ac:cxnSpMkLst>
-            <pc:docMk/>
-            <pc:sldMk cId="1978429239" sldId="366"/>
-            <ac:cxnSpMk id="4" creationId="{C4BA1D0F-B360-D8C9-724F-A6A99DEDE996}"/>
-          </ac:cxnSpMkLst>
-        </pc:cxnChg>
-        <pc:cxnChg chg="mod">
-          <ac:chgData name="Joshua Reiss" userId="71f87c30-4769-4a42-a082-a6a82298c8cb" providerId="ADAL" clId="{D788B803-6CAF-456E-9D5B-399D0D7F1309}" dt="2025-03-22T11:39:20.888" v="1221" actId="1038"/>
-          <ac:cxnSpMkLst>
-            <pc:docMk/>
-            <pc:sldMk cId="1978429239" sldId="366"/>
-            <ac:cxnSpMk id="11" creationId="{07F3DAB7-7441-6D84-2C9C-B8D2386AA51E}"/>
-          </ac:cxnSpMkLst>
-        </pc:cxnChg>
-        <pc:cxnChg chg="add mod">
-          <ac:chgData name="Joshua Reiss" userId="71f87c30-4769-4a42-a082-a6a82298c8cb" providerId="ADAL" clId="{D788B803-6CAF-456E-9D5B-399D0D7F1309}" dt="2025-03-23T09:24:35.273" v="1407" actId="1076"/>
-          <ac:cxnSpMkLst>
-            <pc:docMk/>
-            <pc:sldMk cId="1978429239" sldId="366"/>
-            <ac:cxnSpMk id="15" creationId="{82442B66-32C3-0842-0AEA-E61A5A63BD52}"/>
-          </ac:cxnSpMkLst>
-        </pc:cxnChg>
-        <pc:cxnChg chg="mod">
-          <ac:chgData name="Joshua Reiss" userId="71f87c30-4769-4a42-a082-a6a82298c8cb" providerId="ADAL" clId="{D788B803-6CAF-456E-9D5B-399D0D7F1309}" dt="2025-03-22T11:39:20.888" v="1221" actId="1038"/>
-          <ac:cxnSpMkLst>
-            <pc:docMk/>
-            <pc:sldMk cId="1978429239" sldId="366"/>
-            <ac:cxnSpMk id="19" creationId="{535C8D5E-0003-947E-4D80-6F404A830860}"/>
-          </ac:cxnSpMkLst>
-        </pc:cxnChg>
-        <pc:cxnChg chg="mod">
-          <ac:chgData name="Joshua Reiss" userId="71f87c30-4769-4a42-a082-a6a82298c8cb" providerId="ADAL" clId="{D788B803-6CAF-456E-9D5B-399D0D7F1309}" dt="2025-03-22T14:29:47.555" v="1383" actId="14100"/>
-          <ac:cxnSpMkLst>
-            <pc:docMk/>
-            <pc:sldMk cId="1978429239" sldId="366"/>
-            <ac:cxnSpMk id="36" creationId="{0453826F-0286-1179-F325-A8E54373DDE0}"/>
-          </ac:cxnSpMkLst>
-        </pc:cxnChg>
-        <pc:cxnChg chg="mod">
-          <ac:chgData name="Joshua Reiss" userId="71f87c30-4769-4a42-a082-a6a82298c8cb" providerId="ADAL" clId="{D788B803-6CAF-456E-9D5B-399D0D7F1309}" dt="2025-03-22T14:29:40.133" v="1382" actId="14100"/>
-          <ac:cxnSpMkLst>
-            <pc:docMk/>
-            <pc:sldMk cId="1978429239" sldId="366"/>
-            <ac:cxnSpMk id="37" creationId="{5ECE7EE9-AA27-52E7-FD42-5D2AC3EA472B}"/>
-          </ac:cxnSpMkLst>
-        </pc:cxnChg>
-        <pc:cxnChg chg="mod">
-          <ac:chgData name="Joshua Reiss" userId="71f87c30-4769-4a42-a082-a6a82298c8cb" providerId="ADAL" clId="{D788B803-6CAF-456E-9D5B-399D0D7F1309}" dt="2025-03-22T14:29:19.933" v="1312" actId="1076"/>
-          <ac:cxnSpMkLst>
-            <pc:docMk/>
-            <pc:sldMk cId="1978429239" sldId="366"/>
-            <ac:cxnSpMk id="40" creationId="{A2F25FD9-998D-870B-EF06-214A8F7D0713}"/>
-          </ac:cxnSpMkLst>
-        </pc:cxnChg>
-        <pc:cxnChg chg="mod">
-          <ac:chgData name="Joshua Reiss" userId="71f87c30-4769-4a42-a082-a6a82298c8cb" providerId="ADAL" clId="{D788B803-6CAF-456E-9D5B-399D0D7F1309}" dt="2025-03-22T14:29:31.801" v="1381" actId="1038"/>
-          <ac:cxnSpMkLst>
-            <pc:docMk/>
-            <pc:sldMk cId="1978429239" sldId="366"/>
-            <ac:cxnSpMk id="64" creationId="{A717C41E-E2DE-DA1E-78F3-8F0B57A7016E}"/>
-          </ac:cxnSpMkLst>
-        </pc:cxnChg>
       </pc:sldChg>
       <pc:sldChg chg="addSp delSp modSp add mod">
         <pc:chgData name="Joshua Reiss" userId="71f87c30-4769-4a42-a082-a6a82298c8cb" providerId="ADAL" clId="{D788B803-6CAF-456E-9D5B-399D0D7F1309}" dt="2025-04-02T15:03:00.425" v="2167" actId="692"/>
@@ -1186,350 +346,6 @@
           <pc:docMk/>
           <pc:sldMk cId="361188305" sldId="367"/>
         </pc:sldMkLst>
-        <pc:spChg chg="mod">
-          <ac:chgData name="Joshua Reiss" userId="71f87c30-4769-4a42-a082-a6a82298c8cb" providerId="ADAL" clId="{D788B803-6CAF-456E-9D5B-399D0D7F1309}" dt="2025-04-02T14:52:36.631" v="1968" actId="1037"/>
-          <ac:spMkLst>
-            <pc:docMk/>
-            <pc:sldMk cId="361188305" sldId="367"/>
-            <ac:spMk id="2" creationId="{2BDF3B9B-2CD2-FF66-619B-71A70248F83B}"/>
-          </ac:spMkLst>
-        </pc:spChg>
-        <pc:spChg chg="mod">
-          <ac:chgData name="Joshua Reiss" userId="71f87c30-4769-4a42-a082-a6a82298c8cb" providerId="ADAL" clId="{D788B803-6CAF-456E-9D5B-399D0D7F1309}" dt="2025-04-02T14:52:50.622" v="1970" actId="20577"/>
-          <ac:spMkLst>
-            <pc:docMk/>
-            <pc:sldMk cId="361188305" sldId="367"/>
-            <ac:spMk id="3" creationId="{537C1518-FC9C-A674-2370-630D06D5E019}"/>
-          </ac:spMkLst>
-        </pc:spChg>
-        <pc:spChg chg="mod">
-          <ac:chgData name="Joshua Reiss" userId="71f87c30-4769-4a42-a082-a6a82298c8cb" providerId="ADAL" clId="{D788B803-6CAF-456E-9D5B-399D0D7F1309}" dt="2025-04-02T15:02:00.301" v="2157" actId="1076"/>
-          <ac:spMkLst>
-            <pc:docMk/>
-            <pc:sldMk cId="361188305" sldId="367"/>
-            <ac:spMk id="4" creationId="{D0D676E3-23D6-12B3-1754-0EBED5F45961}"/>
-          </ac:spMkLst>
-        </pc:spChg>
-        <pc:spChg chg="add mod">
-          <ac:chgData name="Joshua Reiss" userId="71f87c30-4769-4a42-a082-a6a82298c8cb" providerId="ADAL" clId="{D788B803-6CAF-456E-9D5B-399D0D7F1309}" dt="2025-04-02T15:02:00.301" v="2157" actId="1076"/>
-          <ac:spMkLst>
-            <pc:docMk/>
-            <pc:sldMk cId="361188305" sldId="367"/>
-            <ac:spMk id="5" creationId="{696CECA3-B8C5-D9F8-BE52-A9385EC84C10}"/>
-          </ac:spMkLst>
-        </pc:spChg>
-        <pc:spChg chg="del mod">
-          <ac:chgData name="Joshua Reiss" userId="71f87c30-4769-4a42-a082-a6a82298c8cb" providerId="ADAL" clId="{D788B803-6CAF-456E-9D5B-399D0D7F1309}" dt="2025-04-02T15:01:38.136" v="2156" actId="478"/>
-          <ac:spMkLst>
-            <pc:docMk/>
-            <pc:sldMk cId="361188305" sldId="367"/>
-            <ac:spMk id="6" creationId="{87F93E69-6096-65B3-D588-ABBB33D8DDA9}"/>
-          </ac:spMkLst>
-        </pc:spChg>
-        <pc:spChg chg="del mod">
-          <ac:chgData name="Joshua Reiss" userId="71f87c30-4769-4a42-a082-a6a82298c8cb" providerId="ADAL" clId="{D788B803-6CAF-456E-9D5B-399D0D7F1309}" dt="2025-04-02T15:01:38.136" v="2156" actId="478"/>
-          <ac:spMkLst>
-            <pc:docMk/>
-            <pc:sldMk cId="361188305" sldId="367"/>
-            <ac:spMk id="7" creationId="{2357D5EA-7B8F-8E7A-970F-8C39EFCAD83B}"/>
-          </ac:spMkLst>
-        </pc:spChg>
-        <pc:spChg chg="del mod">
-          <ac:chgData name="Joshua Reiss" userId="71f87c30-4769-4a42-a082-a6a82298c8cb" providerId="ADAL" clId="{D788B803-6CAF-456E-9D5B-399D0D7F1309}" dt="2025-04-02T15:01:38.136" v="2156" actId="478"/>
-          <ac:spMkLst>
-            <pc:docMk/>
-            <pc:sldMk cId="361188305" sldId="367"/>
-            <ac:spMk id="12" creationId="{CD32628B-42A3-DB15-6B54-B0BFA3204AD7}"/>
-          </ac:spMkLst>
-        </pc:spChg>
-        <pc:spChg chg="mod">
-          <ac:chgData name="Joshua Reiss" userId="71f87c30-4769-4a42-a082-a6a82298c8cb" providerId="ADAL" clId="{D788B803-6CAF-456E-9D5B-399D0D7F1309}" dt="2025-04-02T15:00:23.280" v="2150" actId="1036"/>
-          <ac:spMkLst>
-            <pc:docMk/>
-            <pc:sldMk cId="361188305" sldId="367"/>
-            <ac:spMk id="14" creationId="{57497EBD-5EC8-B396-CBF7-54028041AB63}"/>
-          </ac:spMkLst>
-        </pc:spChg>
-        <pc:spChg chg="del mod">
-          <ac:chgData name="Joshua Reiss" userId="71f87c30-4769-4a42-a082-a6a82298c8cb" providerId="ADAL" clId="{D788B803-6CAF-456E-9D5B-399D0D7F1309}" dt="2025-04-02T15:01:38.136" v="2156" actId="478"/>
-          <ac:spMkLst>
-            <pc:docMk/>
-            <pc:sldMk cId="361188305" sldId="367"/>
-            <ac:spMk id="16" creationId="{3831961C-D695-D27E-9EA0-D046E5AD5BD4}"/>
-          </ac:spMkLst>
-        </pc:spChg>
-        <pc:spChg chg="add mod">
-          <ac:chgData name="Joshua Reiss" userId="71f87c30-4769-4a42-a082-a6a82298c8cb" providerId="ADAL" clId="{D788B803-6CAF-456E-9D5B-399D0D7F1309}" dt="2025-04-02T15:02:00.301" v="2157" actId="1076"/>
-          <ac:spMkLst>
-            <pc:docMk/>
-            <pc:sldMk cId="361188305" sldId="367"/>
-            <ac:spMk id="17" creationId="{1302B20C-E462-54A0-30BD-18A1F2B56E05}"/>
-          </ac:spMkLst>
-        </pc:spChg>
-        <pc:spChg chg="add mod">
-          <ac:chgData name="Joshua Reiss" userId="71f87c30-4769-4a42-a082-a6a82298c8cb" providerId="ADAL" clId="{D788B803-6CAF-456E-9D5B-399D0D7F1309}" dt="2025-04-02T15:02:00.301" v="2157" actId="1076"/>
-          <ac:spMkLst>
-            <pc:docMk/>
-            <pc:sldMk cId="361188305" sldId="367"/>
-            <ac:spMk id="19" creationId="{2F78DF86-838D-F903-9F64-B470FBCB7563}"/>
-          </ac:spMkLst>
-        </pc:spChg>
-        <pc:spChg chg="del mod">
-          <ac:chgData name="Joshua Reiss" userId="71f87c30-4769-4a42-a082-a6a82298c8cb" providerId="ADAL" clId="{D788B803-6CAF-456E-9D5B-399D0D7F1309}" dt="2025-04-02T15:01:38.136" v="2156" actId="478"/>
-          <ac:spMkLst>
-            <pc:docMk/>
-            <pc:sldMk cId="361188305" sldId="367"/>
-            <ac:spMk id="20" creationId="{CB201BFB-1144-B05F-E479-12644E50CA4C}"/>
-          </ac:spMkLst>
-        </pc:spChg>
-        <pc:spChg chg="del mod">
-          <ac:chgData name="Joshua Reiss" userId="71f87c30-4769-4a42-a082-a6a82298c8cb" providerId="ADAL" clId="{D788B803-6CAF-456E-9D5B-399D0D7F1309}" dt="2025-04-02T15:01:38.136" v="2156" actId="478"/>
-          <ac:spMkLst>
-            <pc:docMk/>
-            <pc:sldMk cId="361188305" sldId="367"/>
-            <ac:spMk id="21" creationId="{F056F45D-45CA-DD06-E1D0-6768BB5CA925}"/>
-          </ac:spMkLst>
-        </pc:spChg>
-        <pc:spChg chg="del mod">
-          <ac:chgData name="Joshua Reiss" userId="71f87c30-4769-4a42-a082-a6a82298c8cb" providerId="ADAL" clId="{D788B803-6CAF-456E-9D5B-399D0D7F1309}" dt="2025-04-02T15:01:38.136" v="2156" actId="478"/>
-          <ac:spMkLst>
-            <pc:docMk/>
-            <pc:sldMk cId="361188305" sldId="367"/>
-            <ac:spMk id="22" creationId="{F1FC6F69-8F64-8160-FF9D-201EA79918A8}"/>
-          </ac:spMkLst>
-        </pc:spChg>
-        <pc:spChg chg="add mod">
-          <ac:chgData name="Joshua Reiss" userId="71f87c30-4769-4a42-a082-a6a82298c8cb" providerId="ADAL" clId="{D788B803-6CAF-456E-9D5B-399D0D7F1309}" dt="2025-04-02T15:02:16.221" v="2160" actId="1076"/>
-          <ac:spMkLst>
-            <pc:docMk/>
-            <pc:sldMk cId="361188305" sldId="367"/>
-            <ac:spMk id="24" creationId="{F1BA3A6E-8860-6EFF-F748-38FCEFF84765}"/>
-          </ac:spMkLst>
-        </pc:spChg>
-        <pc:spChg chg="add mod">
-          <ac:chgData name="Joshua Reiss" userId="71f87c30-4769-4a42-a082-a6a82298c8cb" providerId="ADAL" clId="{D788B803-6CAF-456E-9D5B-399D0D7F1309}" dt="2025-04-02T15:02:00.301" v="2157" actId="1076"/>
-          <ac:spMkLst>
-            <pc:docMk/>
-            <pc:sldMk cId="361188305" sldId="367"/>
-            <ac:spMk id="25" creationId="{9967E91F-4608-2900-A2C4-260BA09FD82B}"/>
-          </ac:spMkLst>
-        </pc:spChg>
-        <pc:spChg chg="add mod">
-          <ac:chgData name="Joshua Reiss" userId="71f87c30-4769-4a42-a082-a6a82298c8cb" providerId="ADAL" clId="{D788B803-6CAF-456E-9D5B-399D0D7F1309}" dt="2025-04-02T15:02:00.301" v="2157" actId="1076"/>
-          <ac:spMkLst>
-            <pc:docMk/>
-            <pc:sldMk cId="361188305" sldId="367"/>
-            <ac:spMk id="26" creationId="{4433AE59-D929-F5BA-081B-70215EAC3357}"/>
-          </ac:spMkLst>
-        </pc:spChg>
-        <pc:spChg chg="add mod">
-          <ac:chgData name="Joshua Reiss" userId="71f87c30-4769-4a42-a082-a6a82298c8cb" providerId="ADAL" clId="{D788B803-6CAF-456E-9D5B-399D0D7F1309}" dt="2025-04-02T15:02:00.301" v="2157" actId="1076"/>
-          <ac:spMkLst>
-            <pc:docMk/>
-            <pc:sldMk cId="361188305" sldId="367"/>
-            <ac:spMk id="27" creationId="{1B930658-1835-4F9A-139B-F70C7B0BF41E}"/>
-          </ac:spMkLst>
-        </pc:spChg>
-        <pc:spChg chg="del mod">
-          <ac:chgData name="Joshua Reiss" userId="71f87c30-4769-4a42-a082-a6a82298c8cb" providerId="ADAL" clId="{D788B803-6CAF-456E-9D5B-399D0D7F1309}" dt="2025-04-02T15:01:38.136" v="2156" actId="478"/>
-          <ac:spMkLst>
-            <pc:docMk/>
-            <pc:sldMk cId="361188305" sldId="367"/>
-            <ac:spMk id="29" creationId="{AA810A07-B6EA-1058-7947-3ECA04449490}"/>
-          </ac:spMkLst>
-        </pc:spChg>
-        <pc:spChg chg="add del mod">
-          <ac:chgData name="Joshua Reiss" userId="71f87c30-4769-4a42-a082-a6a82298c8cb" providerId="ADAL" clId="{D788B803-6CAF-456E-9D5B-399D0D7F1309}" dt="2025-04-02T14:51:41.926" v="1916" actId="21"/>
-          <ac:spMkLst>
-            <pc:docMk/>
-            <pc:sldMk cId="361188305" sldId="367"/>
-            <ac:spMk id="40" creationId="{D943C749-2EF5-A269-5F9A-6583B37E17E5}"/>
-          </ac:spMkLst>
-        </pc:spChg>
-        <pc:spChg chg="add mod">
-          <ac:chgData name="Joshua Reiss" userId="71f87c30-4769-4a42-a082-a6a82298c8cb" providerId="ADAL" clId="{D788B803-6CAF-456E-9D5B-399D0D7F1309}" dt="2025-04-02T15:02:00.301" v="2157" actId="1076"/>
-          <ac:spMkLst>
-            <pc:docMk/>
-            <pc:sldMk cId="361188305" sldId="367"/>
-            <ac:spMk id="43" creationId="{F30A3EEF-3D0E-D9B5-9807-66C573F9731E}"/>
-          </ac:spMkLst>
-        </pc:spChg>
-        <pc:spChg chg="add mod">
-          <ac:chgData name="Joshua Reiss" userId="71f87c30-4769-4a42-a082-a6a82298c8cb" providerId="ADAL" clId="{D788B803-6CAF-456E-9D5B-399D0D7F1309}" dt="2025-04-02T15:02:00.301" v="2157" actId="1076"/>
-          <ac:spMkLst>
-            <pc:docMk/>
-            <pc:sldMk cId="361188305" sldId="367"/>
-            <ac:spMk id="47" creationId="{F299329D-C46A-2D46-C7FE-7EAB7E4B01B8}"/>
-          </ac:spMkLst>
-        </pc:spChg>
-        <pc:spChg chg="add del">
-          <ac:chgData name="Joshua Reiss" userId="71f87c30-4769-4a42-a082-a6a82298c8cb" providerId="ADAL" clId="{D788B803-6CAF-456E-9D5B-399D0D7F1309}" dt="2025-04-02T14:48:22.688" v="1895" actId="478"/>
-          <ac:spMkLst>
-            <pc:docMk/>
-            <pc:sldMk cId="361188305" sldId="367"/>
-            <ac:spMk id="48" creationId="{499B072D-6D07-3AF4-9BE5-98B50AC38F76}"/>
-          </ac:spMkLst>
-        </pc:spChg>
-        <pc:spChg chg="add mod">
-          <ac:chgData name="Joshua Reiss" userId="71f87c30-4769-4a42-a082-a6a82298c8cb" providerId="ADAL" clId="{D788B803-6CAF-456E-9D5B-399D0D7F1309}" dt="2025-04-02T15:00:23.280" v="2150" actId="1036"/>
-          <ac:spMkLst>
-            <pc:docMk/>
-            <pc:sldMk cId="361188305" sldId="367"/>
-            <ac:spMk id="52" creationId="{D943C749-2EF5-A269-5F9A-6583B37E17E5}"/>
-          </ac:spMkLst>
-        </pc:spChg>
-        <pc:cxnChg chg="mod">
-          <ac:chgData name="Joshua Reiss" userId="71f87c30-4769-4a42-a082-a6a82298c8cb" providerId="ADAL" clId="{D788B803-6CAF-456E-9D5B-399D0D7F1309}" dt="2025-04-02T14:55:40.409" v="2071" actId="1037"/>
-          <ac:cxnSpMkLst>
-            <pc:docMk/>
-            <pc:sldMk cId="361188305" sldId="367"/>
-            <ac:cxnSpMk id="8" creationId="{8AC7A20B-39A5-5389-F67D-80A1D5A4C9EF}"/>
-          </ac:cxnSpMkLst>
-        </pc:cxnChg>
-        <pc:cxnChg chg="mod">
-          <ac:chgData name="Joshua Reiss" userId="71f87c30-4769-4a42-a082-a6a82298c8cb" providerId="ADAL" clId="{D788B803-6CAF-456E-9D5B-399D0D7F1309}" dt="2025-04-02T15:03:00.425" v="2167" actId="692"/>
-          <ac:cxnSpMkLst>
-            <pc:docMk/>
-            <pc:sldMk cId="361188305" sldId="367"/>
-            <ac:cxnSpMk id="9" creationId="{F931C0E5-D2E8-F9BB-994D-6048E2C23EAC}"/>
-          </ac:cxnSpMkLst>
-        </pc:cxnChg>
-        <pc:cxnChg chg="mod">
-          <ac:chgData name="Joshua Reiss" userId="71f87c30-4769-4a42-a082-a6a82298c8cb" providerId="ADAL" clId="{D788B803-6CAF-456E-9D5B-399D0D7F1309}" dt="2025-04-02T14:57:24.629" v="2121" actId="1076"/>
-          <ac:cxnSpMkLst>
-            <pc:docMk/>
-            <pc:sldMk cId="361188305" sldId="367"/>
-            <ac:cxnSpMk id="10" creationId="{64D1CBA7-3297-EE40-1CE5-78FAD9E776F2}"/>
-          </ac:cxnSpMkLst>
-        </pc:cxnChg>
-        <pc:cxnChg chg="del mod">
-          <ac:chgData name="Joshua Reiss" userId="71f87c30-4769-4a42-a082-a6a82298c8cb" providerId="ADAL" clId="{D788B803-6CAF-456E-9D5B-399D0D7F1309}" dt="2025-04-02T15:02:21.014" v="2161" actId="478"/>
-          <ac:cxnSpMkLst>
-            <pc:docMk/>
-            <pc:sldMk cId="361188305" sldId="367"/>
-            <ac:cxnSpMk id="11" creationId="{D2809EB5-2CFA-ED0C-DA50-6E9DD3D793DB}"/>
-          </ac:cxnSpMkLst>
-        </pc:cxnChg>
-        <pc:cxnChg chg="del mod">
-          <ac:chgData name="Joshua Reiss" userId="71f87c30-4769-4a42-a082-a6a82298c8cb" providerId="ADAL" clId="{D788B803-6CAF-456E-9D5B-399D0D7F1309}" dt="2025-04-02T15:01:38.136" v="2156" actId="478"/>
-          <ac:cxnSpMkLst>
-            <pc:docMk/>
-            <pc:sldMk cId="361188305" sldId="367"/>
-            <ac:cxnSpMk id="13" creationId="{3E628E1C-3B51-16EF-1F9A-C8C6DE316106}"/>
-          </ac:cxnSpMkLst>
-        </pc:cxnChg>
-        <pc:cxnChg chg="mod">
-          <ac:chgData name="Joshua Reiss" userId="71f87c30-4769-4a42-a082-a6a82298c8cb" providerId="ADAL" clId="{D788B803-6CAF-456E-9D5B-399D0D7F1309}" dt="2025-04-02T14:55:51.636" v="2079" actId="1037"/>
-          <ac:cxnSpMkLst>
-            <pc:docMk/>
-            <pc:sldMk cId="361188305" sldId="367"/>
-            <ac:cxnSpMk id="15" creationId="{01A81E16-A3CB-11F2-F1B1-C93C2BACA4DE}"/>
-          </ac:cxnSpMkLst>
-        </pc:cxnChg>
-        <pc:cxnChg chg="add mod">
-          <ac:chgData name="Joshua Reiss" userId="71f87c30-4769-4a42-a082-a6a82298c8cb" providerId="ADAL" clId="{D788B803-6CAF-456E-9D5B-399D0D7F1309}" dt="2025-04-02T14:57:12.599" v="2120" actId="1076"/>
-          <ac:cxnSpMkLst>
-            <pc:docMk/>
-            <pc:sldMk cId="361188305" sldId="367"/>
-            <ac:cxnSpMk id="18" creationId="{8188CBD4-5175-E103-6A23-E77B1843DB88}"/>
-          </ac:cxnSpMkLst>
-        </pc:cxnChg>
-        <pc:cxnChg chg="mod">
-          <ac:chgData name="Joshua Reiss" userId="71f87c30-4769-4a42-a082-a6a82298c8cb" providerId="ADAL" clId="{D788B803-6CAF-456E-9D5B-399D0D7F1309}" dt="2025-04-02T14:28:05.521" v="1608" actId="1036"/>
-          <ac:cxnSpMkLst>
-            <pc:docMk/>
-            <pc:sldMk cId="361188305" sldId="367"/>
-            <ac:cxnSpMk id="23" creationId="{23C37E99-6C2B-52C6-ECE0-6DB507E1AC4C}"/>
-          </ac:cxnSpMkLst>
-        </pc:cxnChg>
-        <pc:cxnChg chg="del mod">
-          <ac:chgData name="Joshua Reiss" userId="71f87c30-4769-4a42-a082-a6a82298c8cb" providerId="ADAL" clId="{D788B803-6CAF-456E-9D5B-399D0D7F1309}" dt="2025-04-02T15:01:38.136" v="2156" actId="478"/>
-          <ac:cxnSpMkLst>
-            <pc:docMk/>
-            <pc:sldMk cId="361188305" sldId="367"/>
-            <ac:cxnSpMk id="28" creationId="{DB9F9A6B-0A87-B78A-736C-AB7A1B398082}"/>
-          </ac:cxnSpMkLst>
-        </pc:cxnChg>
-        <pc:cxnChg chg="mod">
-          <ac:chgData name="Joshua Reiss" userId="71f87c30-4769-4a42-a082-a6a82298c8cb" providerId="ADAL" clId="{D788B803-6CAF-456E-9D5B-399D0D7F1309}" dt="2025-04-02T14:28:05.521" v="1608" actId="1036"/>
-          <ac:cxnSpMkLst>
-            <pc:docMk/>
-            <pc:sldMk cId="361188305" sldId="367"/>
-            <ac:cxnSpMk id="30" creationId="{D4F1248D-199E-F13E-203A-70B16A2AFC1D}"/>
-          </ac:cxnSpMkLst>
-        </pc:cxnChg>
-        <pc:cxnChg chg="add mod">
-          <ac:chgData name="Joshua Reiss" userId="71f87c30-4769-4a42-a082-a6a82298c8cb" providerId="ADAL" clId="{D788B803-6CAF-456E-9D5B-399D0D7F1309}" dt="2025-04-02T14:55:40.409" v="2071" actId="1037"/>
-          <ac:cxnSpMkLst>
-            <pc:docMk/>
-            <pc:sldMk cId="361188305" sldId="367"/>
-            <ac:cxnSpMk id="31" creationId="{F0D86319-757D-C7EB-3DA4-27F961BF2C7E}"/>
-          </ac:cxnSpMkLst>
-        </pc:cxnChg>
-        <pc:cxnChg chg="add mod">
-          <ac:chgData name="Joshua Reiss" userId="71f87c30-4769-4a42-a082-a6a82298c8cb" providerId="ADAL" clId="{D788B803-6CAF-456E-9D5B-399D0D7F1309}" dt="2025-04-02T14:57:24.629" v="2121" actId="1076"/>
-          <ac:cxnSpMkLst>
-            <pc:docMk/>
-            <pc:sldMk cId="361188305" sldId="367"/>
-            <ac:cxnSpMk id="35" creationId="{58B383E1-1670-4B7D-3018-BC2DDE9AC4DC}"/>
-          </ac:cxnSpMkLst>
-        </pc:cxnChg>
-        <pc:cxnChg chg="add mod">
-          <ac:chgData name="Joshua Reiss" userId="71f87c30-4769-4a42-a082-a6a82298c8cb" providerId="ADAL" clId="{D788B803-6CAF-456E-9D5B-399D0D7F1309}" dt="2025-04-02T14:59:57.574" v="2139" actId="1076"/>
-          <ac:cxnSpMkLst>
-            <pc:docMk/>
-            <pc:sldMk cId="361188305" sldId="367"/>
-            <ac:cxnSpMk id="41" creationId="{88742755-497A-3B34-48CF-385E33746C8F}"/>
-          </ac:cxnSpMkLst>
-        </pc:cxnChg>
-        <pc:cxnChg chg="add del mod">
-          <ac:chgData name="Joshua Reiss" userId="71f87c30-4769-4a42-a082-a6a82298c8cb" providerId="ADAL" clId="{D788B803-6CAF-456E-9D5B-399D0D7F1309}" dt="2025-04-02T14:51:41.926" v="1916" actId="21"/>
-          <ac:cxnSpMkLst>
-            <pc:docMk/>
-            <pc:sldMk cId="361188305" sldId="367"/>
-            <ac:cxnSpMk id="44" creationId="{8DC0A924-F747-D85E-3E49-82A1832F2461}"/>
-          </ac:cxnSpMkLst>
-        </pc:cxnChg>
-        <pc:cxnChg chg="add mod">
-          <ac:chgData name="Joshua Reiss" userId="71f87c30-4769-4a42-a082-a6a82298c8cb" providerId="ADAL" clId="{D788B803-6CAF-456E-9D5B-399D0D7F1309}" dt="2025-04-02T15:02:16.221" v="2160" actId="1076"/>
-          <ac:cxnSpMkLst>
-            <pc:docMk/>
-            <pc:sldMk cId="361188305" sldId="367"/>
-            <ac:cxnSpMk id="49" creationId="{F8523D93-187C-B86A-7695-3BAC3E8AB0B5}"/>
-          </ac:cxnSpMkLst>
-        </pc:cxnChg>
-        <pc:cxnChg chg="add mod">
-          <ac:chgData name="Joshua Reiss" userId="71f87c30-4769-4a42-a082-a6a82298c8cb" providerId="ADAL" clId="{D788B803-6CAF-456E-9D5B-399D0D7F1309}" dt="2025-04-02T15:02:16.221" v="2160" actId="1076"/>
-          <ac:cxnSpMkLst>
-            <pc:docMk/>
-            <pc:sldMk cId="361188305" sldId="367"/>
-            <ac:cxnSpMk id="53" creationId="{8DC0A924-F747-D85E-3E49-82A1832F2461}"/>
-          </ac:cxnSpMkLst>
-        </pc:cxnChg>
-        <pc:cxnChg chg="add mod">
-          <ac:chgData name="Joshua Reiss" userId="71f87c30-4769-4a42-a082-a6a82298c8cb" providerId="ADAL" clId="{D788B803-6CAF-456E-9D5B-399D0D7F1309}" dt="2025-04-02T15:00:10.497" v="2141" actId="14100"/>
-          <ac:cxnSpMkLst>
-            <pc:docMk/>
-            <pc:sldMk cId="361188305" sldId="367"/>
-            <ac:cxnSpMk id="56" creationId="{D0DE5017-A1DB-FA3D-FA36-81FD14ABD33B}"/>
-          </ac:cxnSpMkLst>
-        </pc:cxnChg>
-        <pc:cxnChg chg="add mod">
-          <ac:chgData name="Joshua Reiss" userId="71f87c30-4769-4a42-a082-a6a82298c8cb" providerId="ADAL" clId="{D788B803-6CAF-456E-9D5B-399D0D7F1309}" dt="2025-04-02T14:59:57.574" v="2139" actId="1076"/>
-          <ac:cxnSpMkLst>
-            <pc:docMk/>
-            <pc:sldMk cId="361188305" sldId="367"/>
-            <ac:cxnSpMk id="59" creationId="{7E3B8840-31C2-6E09-B448-448D29C88F7C}"/>
-          </ac:cxnSpMkLst>
-        </pc:cxnChg>
-        <pc:cxnChg chg="add mod">
-          <ac:chgData name="Joshua Reiss" userId="71f87c30-4769-4a42-a082-a6a82298c8cb" providerId="ADAL" clId="{D788B803-6CAF-456E-9D5B-399D0D7F1309}" dt="2025-04-02T15:02:34.826" v="2165" actId="14100"/>
-          <ac:cxnSpMkLst>
-            <pc:docMk/>
-            <pc:sldMk cId="361188305" sldId="367"/>
-            <ac:cxnSpMk id="76" creationId="{715D4242-96F4-19FF-4283-E8397F1B75B3}"/>
-          </ac:cxnSpMkLst>
-        </pc:cxnChg>
       </pc:sldChg>
     </pc:docChg>
   </pc:docChgLst>
@@ -5523,7 +4339,7 @@
           <a:p>
             <a:fld id="{D8E06A3B-885D-47A2-BBBF-3C17C577BFA5}" type="datetimeFigureOut">
               <a:rPr lang="en-GB" smtClean="0"/>
-              <a:t>02/04/2025</a:t>
+              <a:t>23/07/2025</a:t>
             </a:fld>
             <a:endParaRPr lang="en-GB"/>
           </a:p>
@@ -6024,7 +4840,7 @@
           <a:p>
             <a:fld id="{53F5E260-054C-4638-8D97-401FEF531A6C}" type="datetimeFigureOut">
               <a:rPr lang="en-GB" smtClean="0"/>
-              <a:t>02/04/2025</a:t>
+              <a:t>23/07/2025</a:t>
             </a:fld>
             <a:endParaRPr lang="en-GB"/>
           </a:p>
@@ -6224,7 +5040,7 @@
           <a:p>
             <a:fld id="{53F5E260-054C-4638-8D97-401FEF531A6C}" type="datetimeFigureOut">
               <a:rPr lang="en-GB" smtClean="0"/>
-              <a:t>02/04/2025</a:t>
+              <a:t>23/07/2025</a:t>
             </a:fld>
             <a:endParaRPr lang="en-GB"/>
           </a:p>
@@ -6434,7 +5250,7 @@
           <a:p>
             <a:fld id="{53F5E260-054C-4638-8D97-401FEF531A6C}" type="datetimeFigureOut">
               <a:rPr lang="en-GB" smtClean="0"/>
-              <a:t>02/04/2025</a:t>
+              <a:t>23/07/2025</a:t>
             </a:fld>
             <a:endParaRPr lang="en-GB"/>
           </a:p>
@@ -6634,7 +5450,7 @@
           <a:p>
             <a:fld id="{53F5E260-054C-4638-8D97-401FEF531A6C}" type="datetimeFigureOut">
               <a:rPr lang="en-GB" smtClean="0"/>
-              <a:t>02/04/2025</a:t>
+              <a:t>23/07/2025</a:t>
             </a:fld>
             <a:endParaRPr lang="en-GB"/>
           </a:p>
@@ -6910,7 +5726,7 @@
           <a:p>
             <a:fld id="{53F5E260-054C-4638-8D97-401FEF531A6C}" type="datetimeFigureOut">
               <a:rPr lang="en-GB" smtClean="0"/>
-              <a:t>02/04/2025</a:t>
+              <a:t>23/07/2025</a:t>
             </a:fld>
             <a:endParaRPr lang="en-GB"/>
           </a:p>
@@ -7178,7 +5994,7 @@
           <a:p>
             <a:fld id="{53F5E260-054C-4638-8D97-401FEF531A6C}" type="datetimeFigureOut">
               <a:rPr lang="en-GB" smtClean="0"/>
-              <a:t>02/04/2025</a:t>
+              <a:t>23/07/2025</a:t>
             </a:fld>
             <a:endParaRPr lang="en-GB"/>
           </a:p>
@@ -7593,7 +6409,7 @@
           <a:p>
             <a:fld id="{53F5E260-054C-4638-8D97-401FEF531A6C}" type="datetimeFigureOut">
               <a:rPr lang="en-GB" smtClean="0"/>
-              <a:t>02/04/2025</a:t>
+              <a:t>23/07/2025</a:t>
             </a:fld>
             <a:endParaRPr lang="en-GB"/>
           </a:p>
@@ -7735,7 +6551,7 @@
           <a:p>
             <a:fld id="{53F5E260-054C-4638-8D97-401FEF531A6C}" type="datetimeFigureOut">
               <a:rPr lang="en-GB" smtClean="0"/>
-              <a:t>02/04/2025</a:t>
+              <a:t>23/07/2025</a:t>
             </a:fld>
             <a:endParaRPr lang="en-GB"/>
           </a:p>
@@ -7848,7 +6664,7 @@
           <a:p>
             <a:fld id="{53F5E260-054C-4638-8D97-401FEF531A6C}" type="datetimeFigureOut">
               <a:rPr lang="en-GB" smtClean="0"/>
-              <a:t>02/04/2025</a:t>
+              <a:t>23/07/2025</a:t>
             </a:fld>
             <a:endParaRPr lang="en-GB"/>
           </a:p>
@@ -8161,7 +6977,7 @@
           <a:p>
             <a:fld id="{53F5E260-054C-4638-8D97-401FEF531A6C}" type="datetimeFigureOut">
               <a:rPr lang="en-GB" smtClean="0"/>
-              <a:t>02/04/2025</a:t>
+              <a:t>23/07/2025</a:t>
             </a:fld>
             <a:endParaRPr lang="en-GB"/>
           </a:p>
@@ -8450,7 +7266,7 @@
           <a:p>
             <a:fld id="{53F5E260-054C-4638-8D97-401FEF531A6C}" type="datetimeFigureOut">
               <a:rPr lang="en-GB" smtClean="0"/>
-              <a:t>02/04/2025</a:t>
+              <a:t>23/07/2025</a:t>
             </a:fld>
             <a:endParaRPr lang="en-GB"/>
           </a:p>
@@ -8693,7 +7509,7 @@
           <a:p>
             <a:fld id="{53F5E260-054C-4638-8D97-401FEF531A6C}" type="datetimeFigureOut">
               <a:rPr lang="en-GB" smtClean="0"/>
-              <a:t>02/04/2025</a:t>
+              <a:t>23/07/2025</a:t>
             </a:fld>
             <a:endParaRPr lang="en-GB"/>
           </a:p>
@@ -42009,708 +40825,729 @@
           </a:graphicData>
         </a:graphic>
       </p:graphicFrame>
-      <p:sp>
-        <p:nvSpPr>
-          <p:cNvPr id="8" name="Rectangle 7">
-            <a:extLst>
-              <a:ext uri="{FF2B5EF4-FFF2-40B4-BE49-F238E27FC236}">
-                <a16:creationId xmlns:a16="http://schemas.microsoft.com/office/drawing/2014/main" id="{1A76E437-7554-4B56-C4E2-BB3C0E4AEA31}"/>
-              </a:ext>
-            </a:extLst>
-          </p:cNvPr>
-          <p:cNvSpPr/>
+      <p:grpSp>
+        <p:nvGrpSpPr>
+          <p:cNvPr id="3" name="Group 2">
+            <a:extLst>
+              <a:ext uri="{FF2B5EF4-FFF2-40B4-BE49-F238E27FC236}">
+                <a16:creationId xmlns:a16="http://schemas.microsoft.com/office/drawing/2014/main" id="{8D9C7F2E-0DEE-BB09-7413-0E917DC97552}"/>
+              </a:ext>
+            </a:extLst>
+          </p:cNvPr>
+          <p:cNvGrpSpPr/>
           <p:nvPr/>
-        </p:nvSpPr>
-        <p:spPr>
+        </p:nvGrpSpPr>
+        <p:grpSpPr>
           <a:xfrm>
-            <a:off x="2979413" y="3622521"/>
-            <a:ext cx="1122740" cy="648000"/>
+            <a:off x="1215350" y="2393600"/>
+            <a:ext cx="8479645" cy="1876921"/>
+            <a:chOff x="1215350" y="2393600"/>
+            <a:chExt cx="8479645" cy="1876921"/>
           </a:xfrm>
-          <a:prstGeom prst="rect">
-            <a:avLst/>
-          </a:prstGeom>
-          <a:solidFill>
-            <a:srgbClr val="7030A0"/>
-          </a:solidFill>
-        </p:spPr>
-        <p:style>
-          <a:lnRef idx="2">
-            <a:schemeClr val="accent1">
-              <a:shade val="50000"/>
-            </a:schemeClr>
-          </a:lnRef>
-          <a:fillRef idx="1">
-            <a:schemeClr val="accent1"/>
-          </a:fillRef>
-          <a:effectRef idx="0">
-            <a:schemeClr val="accent1"/>
-          </a:effectRef>
-          <a:fontRef idx="minor">
-            <a:schemeClr val="lt1"/>
-          </a:fontRef>
-        </p:style>
-        <p:txBody>
-          <a:bodyPr rtlCol="0" anchor="ctr"/>
-          <a:lstStyle/>
-          <a:p>
-            <a:pPr algn="ctr"/>
-            <a:r>
-              <a:rPr lang="en-GB" dirty="0"/>
-              <a:t>Filter</a:t>
-            </a:r>
-          </a:p>
-        </p:txBody>
-      </p:sp>
-      <p:sp>
-        <p:nvSpPr>
-          <p:cNvPr id="9" name="Rectangle 8">
-            <a:extLst>
-              <a:ext uri="{FF2B5EF4-FFF2-40B4-BE49-F238E27FC236}">
-                <a16:creationId xmlns:a16="http://schemas.microsoft.com/office/drawing/2014/main" id="{7D6EC9BA-C03E-26D1-FAD2-EAF6500A119B}"/>
-              </a:ext>
-            </a:extLst>
-          </p:cNvPr>
-          <p:cNvSpPr/>
-          <p:nvPr/>
-        </p:nvSpPr>
-        <p:spPr>
-          <a:xfrm>
-            <a:off x="5973332" y="2393600"/>
-            <a:ext cx="1007975" cy="648000"/>
-          </a:xfrm>
-          <a:prstGeom prst="rect">
-            <a:avLst/>
-          </a:prstGeom>
-          <a:solidFill>
-            <a:srgbClr val="7030A0"/>
-          </a:solidFill>
-        </p:spPr>
-        <p:style>
-          <a:lnRef idx="2">
-            <a:schemeClr val="accent1">
-              <a:shade val="50000"/>
-            </a:schemeClr>
-          </a:lnRef>
-          <a:fillRef idx="1">
-            <a:schemeClr val="accent1"/>
-          </a:fillRef>
-          <a:effectRef idx="0">
-            <a:schemeClr val="accent1"/>
-          </a:effectRef>
-          <a:fontRef idx="minor">
-            <a:schemeClr val="lt1"/>
-          </a:fontRef>
-        </p:style>
-        <p:txBody>
-          <a:bodyPr rtlCol="0" anchor="ctr"/>
-          <a:lstStyle/>
-          <a:p>
-            <a:pPr algn="ctr"/>
-            <a:r>
-              <a:rPr lang="en-US" dirty="0"/>
-              <a:t>F</a:t>
-            </a:r>
-            <a:r>
-              <a:rPr lang="en-GB" dirty="0" err="1"/>
-              <a:t>ilter</a:t>
-            </a:r>
-            <a:endParaRPr lang="en-GB" dirty="0"/>
-          </a:p>
-        </p:txBody>
-      </p:sp>
-      <p:sp>
-        <p:nvSpPr>
-          <p:cNvPr id="10" name="Rectangle 9">
-            <a:extLst>
-              <a:ext uri="{FF2B5EF4-FFF2-40B4-BE49-F238E27FC236}">
-                <a16:creationId xmlns:a16="http://schemas.microsoft.com/office/drawing/2014/main" id="{B5081D72-5F55-AF7E-6F70-312422E679C4}"/>
-              </a:ext>
-            </a:extLst>
-          </p:cNvPr>
-          <p:cNvSpPr/>
-          <p:nvPr/>
-        </p:nvSpPr>
-        <p:spPr>
-          <a:xfrm>
-            <a:off x="4417208" y="2393600"/>
-            <a:ext cx="1080000" cy="648000"/>
-          </a:xfrm>
-          <a:prstGeom prst="rect">
-            <a:avLst/>
-          </a:prstGeom>
-          <a:solidFill>
-            <a:srgbClr val="7030A0"/>
-          </a:solidFill>
-        </p:spPr>
-        <p:style>
-          <a:lnRef idx="2">
-            <a:schemeClr val="accent1">
-              <a:shade val="50000"/>
-            </a:schemeClr>
-          </a:lnRef>
-          <a:fillRef idx="1">
-            <a:schemeClr val="accent1"/>
-          </a:fillRef>
-          <a:effectRef idx="0">
-            <a:schemeClr val="accent1"/>
-          </a:effectRef>
-          <a:fontRef idx="minor">
-            <a:schemeClr val="lt1"/>
-          </a:fontRef>
-        </p:style>
-        <p:txBody>
-          <a:bodyPr rtlCol="0" anchor="ctr"/>
-          <a:lstStyle/>
-          <a:p>
-            <a:pPr algn="ctr"/>
-            <a:r>
-              <a:rPr lang="en-GB" dirty="0" err="1"/>
-              <a:t>Feedbackgain</a:t>
-            </a:r>
-            <a:endParaRPr lang="en-GB" dirty="0"/>
-          </a:p>
-        </p:txBody>
-      </p:sp>
-      <p:sp>
-        <p:nvSpPr>
-          <p:cNvPr id="11" name="Rectangle 10">
-            <a:extLst>
-              <a:ext uri="{FF2B5EF4-FFF2-40B4-BE49-F238E27FC236}">
-                <a16:creationId xmlns:a16="http://schemas.microsoft.com/office/drawing/2014/main" id="{02F4F030-6317-C08E-2981-31F49999B6D7}"/>
-              </a:ext>
-            </a:extLst>
-          </p:cNvPr>
-          <p:cNvSpPr/>
-          <p:nvPr/>
-        </p:nvSpPr>
-        <p:spPr>
-          <a:xfrm>
-            <a:off x="8398995" y="3622521"/>
-            <a:ext cx="1296000" cy="648000"/>
-          </a:xfrm>
-          <a:prstGeom prst="rect">
-            <a:avLst/>
-          </a:prstGeom>
-          <a:solidFill>
-            <a:srgbClr val="7030A0"/>
-          </a:solidFill>
-        </p:spPr>
-        <p:style>
-          <a:lnRef idx="2">
-            <a:schemeClr val="accent1">
-              <a:shade val="50000"/>
-            </a:schemeClr>
-          </a:lnRef>
-          <a:fillRef idx="1">
-            <a:schemeClr val="accent1"/>
-          </a:fillRef>
-          <a:effectRef idx="0">
-            <a:schemeClr val="accent1"/>
-          </a:effectRef>
-          <a:fontRef idx="minor">
-            <a:schemeClr val="lt1"/>
-          </a:fontRef>
-        </p:style>
-        <p:txBody>
-          <a:bodyPr rtlCol="0" anchor="ctr"/>
-          <a:lstStyle/>
-          <a:p>
-            <a:pPr algn="ctr"/>
-            <a:r>
-              <a:rPr lang="en-GB" dirty="0"/>
-              <a:t>Output</a:t>
-            </a:r>
-          </a:p>
-        </p:txBody>
-      </p:sp>
-      <p:cxnSp>
-        <p:nvCxnSpPr>
-          <p:cNvPr id="12" name="Straight Arrow Connector 11">
-            <a:extLst>
-              <a:ext uri="{FF2B5EF4-FFF2-40B4-BE49-F238E27FC236}">
-                <a16:creationId xmlns:a16="http://schemas.microsoft.com/office/drawing/2014/main" id="{B54E2B69-FC3F-1E40-A021-6B54743DBF43}"/>
-              </a:ext>
-            </a:extLst>
-          </p:cNvPr>
-          <p:cNvCxnSpPr>
-            <a:cxnSpLocks/>
-            <a:stCxn id="8" idx="3"/>
-            <a:endCxn id="16" idx="2"/>
-          </p:cNvCxnSpPr>
-          <p:nvPr/>
-        </p:nvCxnSpPr>
-        <p:spPr>
-          <a:xfrm>
-            <a:off x="4102153" y="3946521"/>
-            <a:ext cx="576203" cy="0"/>
-          </a:xfrm>
-          <a:prstGeom prst="straightConnector1">
-            <a:avLst/>
-          </a:prstGeom>
-          <a:ln w="31750">
+        </p:grpSpPr>
+        <p:sp>
+          <p:nvSpPr>
+            <p:cNvPr id="8" name="Rectangle 7">
+              <a:extLst>
+                <a:ext uri="{FF2B5EF4-FFF2-40B4-BE49-F238E27FC236}">
+                  <a16:creationId xmlns:a16="http://schemas.microsoft.com/office/drawing/2014/main" id="{1A76E437-7554-4B56-C4E2-BB3C0E4AEA31}"/>
+                </a:ext>
+              </a:extLst>
+            </p:cNvPr>
+            <p:cNvSpPr/>
+            <p:nvPr/>
+          </p:nvSpPr>
+          <p:spPr>
+            <a:xfrm>
+              <a:off x="2979413" y="3622521"/>
+              <a:ext cx="1122740" cy="648000"/>
+            </a:xfrm>
+            <a:prstGeom prst="rect">
+              <a:avLst/>
+            </a:prstGeom>
             <a:solidFill>
+              <a:srgbClr val="7030A0"/>
+            </a:solidFill>
+          </p:spPr>
+          <p:style>
+            <a:lnRef idx="2">
+              <a:schemeClr val="accent1">
+                <a:shade val="50000"/>
+              </a:schemeClr>
+            </a:lnRef>
+            <a:fillRef idx="1">
+              <a:schemeClr val="accent1"/>
+            </a:fillRef>
+            <a:effectRef idx="0">
+              <a:schemeClr val="accent1"/>
+            </a:effectRef>
+            <a:fontRef idx="minor">
+              <a:schemeClr val="lt1"/>
+            </a:fontRef>
+          </p:style>
+          <p:txBody>
+            <a:bodyPr rtlCol="0" anchor="ctr"/>
+            <a:lstStyle/>
+            <a:p>
+              <a:pPr algn="ctr"/>
+              <a:r>
+                <a:rPr lang="en-GB" dirty="0"/>
+                <a:t>Filter</a:t>
+              </a:r>
+            </a:p>
+          </p:txBody>
+        </p:sp>
+        <p:sp>
+          <p:nvSpPr>
+            <p:cNvPr id="9" name="Rectangle 8">
+              <a:extLst>
+                <a:ext uri="{FF2B5EF4-FFF2-40B4-BE49-F238E27FC236}">
+                  <a16:creationId xmlns:a16="http://schemas.microsoft.com/office/drawing/2014/main" id="{7D6EC9BA-C03E-26D1-FAD2-EAF6500A119B}"/>
+                </a:ext>
+              </a:extLst>
+            </p:cNvPr>
+            <p:cNvSpPr/>
+            <p:nvPr/>
+          </p:nvSpPr>
+          <p:spPr>
+            <a:xfrm>
+              <a:off x="5973332" y="2393600"/>
+              <a:ext cx="1007975" cy="648000"/>
+            </a:xfrm>
+            <a:prstGeom prst="rect">
+              <a:avLst/>
+            </a:prstGeom>
+            <a:solidFill>
+              <a:srgbClr val="7030A0"/>
+            </a:solidFill>
+          </p:spPr>
+          <p:style>
+            <a:lnRef idx="2">
+              <a:schemeClr val="accent1">
+                <a:shade val="50000"/>
+              </a:schemeClr>
+            </a:lnRef>
+            <a:fillRef idx="1">
+              <a:schemeClr val="accent1"/>
+            </a:fillRef>
+            <a:effectRef idx="0">
+              <a:schemeClr val="accent1"/>
+            </a:effectRef>
+            <a:fontRef idx="minor">
+              <a:schemeClr val="lt1"/>
+            </a:fontRef>
+          </p:style>
+          <p:txBody>
+            <a:bodyPr rtlCol="0" anchor="ctr"/>
+            <a:lstStyle/>
+            <a:p>
+              <a:pPr algn="ctr"/>
+              <a:r>
+                <a:rPr lang="en-US" dirty="0"/>
+                <a:t>F</a:t>
+              </a:r>
+              <a:r>
+                <a:rPr lang="en-GB" dirty="0" err="1"/>
+                <a:t>ilter</a:t>
+              </a:r>
+              <a:endParaRPr lang="en-GB" dirty="0"/>
+            </a:p>
+          </p:txBody>
+        </p:sp>
+        <p:sp>
+          <p:nvSpPr>
+            <p:cNvPr id="10" name="Rectangle 9">
+              <a:extLst>
+                <a:ext uri="{FF2B5EF4-FFF2-40B4-BE49-F238E27FC236}">
+                  <a16:creationId xmlns:a16="http://schemas.microsoft.com/office/drawing/2014/main" id="{B5081D72-5F55-AF7E-6F70-312422E679C4}"/>
+                </a:ext>
+              </a:extLst>
+            </p:cNvPr>
+            <p:cNvSpPr/>
+            <p:nvPr/>
+          </p:nvSpPr>
+          <p:spPr>
+            <a:xfrm>
+              <a:off x="4417208" y="2393600"/>
+              <a:ext cx="1080000" cy="648000"/>
+            </a:xfrm>
+            <a:prstGeom prst="rect">
+              <a:avLst/>
+            </a:prstGeom>
+            <a:solidFill>
+              <a:srgbClr val="7030A0"/>
+            </a:solidFill>
+          </p:spPr>
+          <p:style>
+            <a:lnRef idx="2">
+              <a:schemeClr val="accent1">
+                <a:shade val="50000"/>
+              </a:schemeClr>
+            </a:lnRef>
+            <a:fillRef idx="1">
+              <a:schemeClr val="accent1"/>
+            </a:fillRef>
+            <a:effectRef idx="0">
+              <a:schemeClr val="accent1"/>
+            </a:effectRef>
+            <a:fontRef idx="minor">
+              <a:schemeClr val="lt1"/>
+            </a:fontRef>
+          </p:style>
+          <p:txBody>
+            <a:bodyPr rtlCol="0" anchor="ctr"/>
+            <a:lstStyle/>
+            <a:p>
+              <a:pPr algn="ctr"/>
+              <a:r>
+                <a:rPr lang="en-GB" dirty="0" err="1"/>
+                <a:t>Feedbackgain</a:t>
+              </a:r>
+              <a:endParaRPr lang="en-GB" dirty="0"/>
+            </a:p>
+          </p:txBody>
+        </p:sp>
+        <p:sp>
+          <p:nvSpPr>
+            <p:cNvPr id="11" name="Rectangle 10">
+              <a:extLst>
+                <a:ext uri="{FF2B5EF4-FFF2-40B4-BE49-F238E27FC236}">
+                  <a16:creationId xmlns:a16="http://schemas.microsoft.com/office/drawing/2014/main" id="{02F4F030-6317-C08E-2981-31F49999B6D7}"/>
+                </a:ext>
+              </a:extLst>
+            </p:cNvPr>
+            <p:cNvSpPr/>
+            <p:nvPr/>
+          </p:nvSpPr>
+          <p:spPr>
+            <a:xfrm>
+              <a:off x="8398995" y="3622521"/>
+              <a:ext cx="1296000" cy="648000"/>
+            </a:xfrm>
+            <a:prstGeom prst="rect">
+              <a:avLst/>
+            </a:prstGeom>
+            <a:solidFill>
+              <a:srgbClr val="7030A0"/>
+            </a:solidFill>
+          </p:spPr>
+          <p:style>
+            <a:lnRef idx="2">
+              <a:schemeClr val="accent1">
+                <a:shade val="50000"/>
+              </a:schemeClr>
+            </a:lnRef>
+            <a:fillRef idx="1">
+              <a:schemeClr val="accent1"/>
+            </a:fillRef>
+            <a:effectRef idx="0">
+              <a:schemeClr val="accent1"/>
+            </a:effectRef>
+            <a:fontRef idx="minor">
+              <a:schemeClr val="lt1"/>
+            </a:fontRef>
+          </p:style>
+          <p:txBody>
+            <a:bodyPr rtlCol="0" anchor="ctr"/>
+            <a:lstStyle/>
+            <a:p>
+              <a:pPr algn="ctr"/>
+              <a:r>
+                <a:rPr lang="en-GB" dirty="0"/>
+                <a:t>Output</a:t>
+              </a:r>
+            </a:p>
+          </p:txBody>
+        </p:sp>
+        <p:cxnSp>
+          <p:nvCxnSpPr>
+            <p:cNvPr id="12" name="Straight Arrow Connector 11">
+              <a:extLst>
+                <a:ext uri="{FF2B5EF4-FFF2-40B4-BE49-F238E27FC236}">
+                  <a16:creationId xmlns:a16="http://schemas.microsoft.com/office/drawing/2014/main" id="{B54E2B69-FC3F-1E40-A021-6B54743DBF43}"/>
+                </a:ext>
+              </a:extLst>
+            </p:cNvPr>
+            <p:cNvCxnSpPr>
+              <a:cxnSpLocks/>
+              <a:stCxn id="8" idx="3"/>
+              <a:endCxn id="16" idx="2"/>
+            </p:cNvCxnSpPr>
+            <p:nvPr/>
+          </p:nvCxnSpPr>
+          <p:spPr>
+            <a:xfrm>
+              <a:off x="4102153" y="3946521"/>
+              <a:ext cx="576203" cy="0"/>
+            </a:xfrm>
+            <a:prstGeom prst="straightConnector1">
+              <a:avLst/>
+            </a:prstGeom>
+            <a:ln w="31750">
+              <a:solidFill>
+                <a:schemeClr val="tx1"/>
+              </a:solidFill>
+              <a:tailEnd type="arrow" w="lg" len="lg"/>
+            </a:ln>
+          </p:spPr>
+          <p:style>
+            <a:lnRef idx="1">
+              <a:schemeClr val="accent1"/>
+            </a:lnRef>
+            <a:fillRef idx="0">
+              <a:schemeClr val="accent1"/>
+            </a:fillRef>
+            <a:effectRef idx="0">
+              <a:schemeClr val="accent1"/>
+            </a:effectRef>
+            <a:fontRef idx="minor">
               <a:schemeClr val="tx1"/>
+            </a:fontRef>
+          </p:style>
+        </p:cxnSp>
+        <p:cxnSp>
+          <p:nvCxnSpPr>
+            <p:cNvPr id="13" name="Straight Arrow Connector 12">
+              <a:extLst>
+                <a:ext uri="{FF2B5EF4-FFF2-40B4-BE49-F238E27FC236}">
+                  <a16:creationId xmlns:a16="http://schemas.microsoft.com/office/drawing/2014/main" id="{8EB431E2-A2AD-7D85-0ADB-335D39FEC41A}"/>
+                </a:ext>
+              </a:extLst>
+            </p:cNvPr>
+            <p:cNvCxnSpPr>
+              <a:cxnSpLocks/>
+              <a:stCxn id="9" idx="1"/>
+              <a:endCxn id="10" idx="3"/>
+            </p:cNvCxnSpPr>
+            <p:nvPr/>
+          </p:nvCxnSpPr>
+          <p:spPr>
+            <a:xfrm flipH="1">
+              <a:off x="5497208" y="2717600"/>
+              <a:ext cx="476124" cy="0"/>
+            </a:xfrm>
+            <a:prstGeom prst="straightConnector1">
+              <a:avLst/>
+            </a:prstGeom>
+            <a:ln w="31750">
+              <a:solidFill>
+                <a:schemeClr val="tx1"/>
+              </a:solidFill>
+              <a:tailEnd type="arrow" w="lg" len="lg"/>
+            </a:ln>
+          </p:spPr>
+          <p:style>
+            <a:lnRef idx="1">
+              <a:schemeClr val="accent1"/>
+            </a:lnRef>
+            <a:fillRef idx="0">
+              <a:schemeClr val="accent1"/>
+            </a:fillRef>
+            <a:effectRef idx="0">
+              <a:schemeClr val="accent1"/>
+            </a:effectRef>
+            <a:fontRef idx="minor">
+              <a:schemeClr val="tx1"/>
+            </a:fontRef>
+          </p:style>
+        </p:cxnSp>
+        <p:cxnSp>
+          <p:nvCxnSpPr>
+            <p:cNvPr id="14" name="Straight Arrow Connector 13">
+              <a:extLst>
+                <a:ext uri="{FF2B5EF4-FFF2-40B4-BE49-F238E27FC236}">
+                  <a16:creationId xmlns:a16="http://schemas.microsoft.com/office/drawing/2014/main" id="{6CA2D6D4-8101-C31B-E123-3862103EBF6E}"/>
+                </a:ext>
+              </a:extLst>
+            </p:cNvPr>
+            <p:cNvCxnSpPr>
+              <a:cxnSpLocks/>
+              <a:endCxn id="22" idx="2"/>
+            </p:cNvCxnSpPr>
+            <p:nvPr/>
+          </p:nvCxnSpPr>
+          <p:spPr>
+            <a:xfrm flipV="1">
+              <a:off x="7894113" y="3041600"/>
+              <a:ext cx="0" cy="904919"/>
+            </a:xfrm>
+            <a:prstGeom prst="straightConnector1">
+              <a:avLst/>
+            </a:prstGeom>
+            <a:ln w="31750">
+              <a:solidFill>
+                <a:schemeClr val="tx1"/>
+              </a:solidFill>
+              <a:tailEnd type="arrow" w="lg" len="lg"/>
+            </a:ln>
+          </p:spPr>
+          <p:style>
+            <a:lnRef idx="1">
+              <a:schemeClr val="accent1"/>
+            </a:lnRef>
+            <a:fillRef idx="0">
+              <a:schemeClr val="accent1"/>
+            </a:fillRef>
+            <a:effectRef idx="0">
+              <a:schemeClr val="accent1"/>
+            </a:effectRef>
+            <a:fontRef idx="minor">
+              <a:schemeClr val="tx1"/>
+            </a:fontRef>
+          </p:style>
+        </p:cxnSp>
+        <p:cxnSp>
+          <p:nvCxnSpPr>
+            <p:cNvPr id="15" name="Straight Arrow Connector 14">
+              <a:extLst>
+                <a:ext uri="{FF2B5EF4-FFF2-40B4-BE49-F238E27FC236}">
+                  <a16:creationId xmlns:a16="http://schemas.microsoft.com/office/drawing/2014/main" id="{53D14D3D-1A10-DEA6-230D-5D42A8C50CD6}"/>
+                </a:ext>
+              </a:extLst>
+            </p:cNvPr>
+            <p:cNvCxnSpPr>
+              <a:cxnSpLocks/>
+              <a:stCxn id="10" idx="2"/>
+              <a:endCxn id="16" idx="0"/>
+            </p:cNvCxnSpPr>
+            <p:nvPr/>
+          </p:nvCxnSpPr>
+          <p:spPr>
+            <a:xfrm flipH="1">
+              <a:off x="4948356" y="3041600"/>
+              <a:ext cx="8852" cy="634921"/>
+            </a:xfrm>
+            <a:prstGeom prst="straightConnector1">
+              <a:avLst/>
+            </a:prstGeom>
+            <a:ln w="31750">
+              <a:solidFill>
+                <a:schemeClr val="tx1"/>
+              </a:solidFill>
+              <a:tailEnd type="arrow" w="lg" len="lg"/>
+            </a:ln>
+          </p:spPr>
+          <p:style>
+            <a:lnRef idx="1">
+              <a:schemeClr val="accent1"/>
+            </a:lnRef>
+            <a:fillRef idx="0">
+              <a:schemeClr val="accent1"/>
+            </a:fillRef>
+            <a:effectRef idx="0">
+              <a:schemeClr val="accent1"/>
+            </a:effectRef>
+            <a:fontRef idx="minor">
+              <a:schemeClr val="tx1"/>
+            </a:fontRef>
+          </p:style>
+        </p:cxnSp>
+        <p:sp>
+          <p:nvSpPr>
+            <p:cNvPr id="16" name="Oval 15">
+              <a:extLst>
+                <a:ext uri="{FF2B5EF4-FFF2-40B4-BE49-F238E27FC236}">
+                  <a16:creationId xmlns:a16="http://schemas.microsoft.com/office/drawing/2014/main" id="{FEA53039-A3DB-31C0-15B9-B21868D43CCD}"/>
+                </a:ext>
+              </a:extLst>
+            </p:cNvPr>
+            <p:cNvSpPr/>
+            <p:nvPr/>
+          </p:nvSpPr>
+          <p:spPr>
+            <a:xfrm>
+              <a:off x="4678356" y="3676521"/>
+              <a:ext cx="540000" cy="540000"/>
+            </a:xfrm>
+            <a:prstGeom prst="ellipse">
+              <a:avLst/>
+            </a:prstGeom>
+            <a:solidFill>
+              <a:srgbClr val="7030A0"/>
             </a:solidFill>
-            <a:tailEnd type="arrow" w="lg" len="lg"/>
-          </a:ln>
-        </p:spPr>
-        <p:style>
-          <a:lnRef idx="1">
-            <a:schemeClr val="accent1"/>
-          </a:lnRef>
-          <a:fillRef idx="0">
-            <a:schemeClr val="accent1"/>
-          </a:fillRef>
-          <a:effectRef idx="0">
-            <a:schemeClr val="accent1"/>
-          </a:effectRef>
-          <a:fontRef idx="minor">
-            <a:schemeClr val="tx1"/>
-          </a:fontRef>
-        </p:style>
-      </p:cxnSp>
-      <p:cxnSp>
-        <p:nvCxnSpPr>
-          <p:cNvPr id="13" name="Straight Arrow Connector 12">
-            <a:extLst>
-              <a:ext uri="{FF2B5EF4-FFF2-40B4-BE49-F238E27FC236}">
-                <a16:creationId xmlns:a16="http://schemas.microsoft.com/office/drawing/2014/main" id="{8EB431E2-A2AD-7D85-0ADB-335D39FEC41A}"/>
-              </a:ext>
-            </a:extLst>
-          </p:cNvPr>
-          <p:cNvCxnSpPr>
-            <a:cxnSpLocks/>
-            <a:stCxn id="9" idx="1"/>
-            <a:endCxn id="10" idx="3"/>
-          </p:cNvCxnSpPr>
-          <p:nvPr/>
-        </p:nvCxnSpPr>
-        <p:spPr>
-          <a:xfrm flipH="1">
-            <a:off x="5497208" y="2717600"/>
-            <a:ext cx="476124" cy="0"/>
-          </a:xfrm>
-          <a:prstGeom prst="straightConnector1">
-            <a:avLst/>
-          </a:prstGeom>
-          <a:ln w="31750">
+            <a:ln w="31750"/>
+          </p:spPr>
+          <p:style>
+            <a:lnRef idx="2">
+              <a:schemeClr val="accent1">
+                <a:shade val="50000"/>
+              </a:schemeClr>
+            </a:lnRef>
+            <a:fillRef idx="1">
+              <a:schemeClr val="accent1"/>
+            </a:fillRef>
+            <a:effectRef idx="0">
+              <a:schemeClr val="accent1"/>
+            </a:effectRef>
+            <a:fontRef idx="minor">
+              <a:schemeClr val="lt1"/>
+            </a:fontRef>
+          </p:style>
+          <p:txBody>
+            <a:bodyPr rtlCol="0" anchor="ctr"/>
+            <a:lstStyle/>
+            <a:p>
+              <a:pPr algn="ctr"/>
+              <a:r>
+                <a:rPr lang="en-GB" sz="3600" dirty="0">
+                  <a:solidFill>
+                    <a:schemeClr val="bg1"/>
+                  </a:solidFill>
+                </a:rPr>
+                <a:t>+</a:t>
+              </a:r>
+            </a:p>
+          </p:txBody>
+        </p:sp>
+        <p:cxnSp>
+          <p:nvCxnSpPr>
+            <p:cNvPr id="17" name="Straight Arrow Connector 16">
+              <a:extLst>
+                <a:ext uri="{FF2B5EF4-FFF2-40B4-BE49-F238E27FC236}">
+                  <a16:creationId xmlns:a16="http://schemas.microsoft.com/office/drawing/2014/main" id="{99376B45-7658-8D09-309B-FEDF0F1BBF33}"/>
+                </a:ext>
+              </a:extLst>
+            </p:cNvPr>
+            <p:cNvCxnSpPr>
+              <a:cxnSpLocks/>
+              <a:stCxn id="16" idx="6"/>
+              <a:endCxn id="11" idx="1"/>
+            </p:cNvCxnSpPr>
+            <p:nvPr/>
+          </p:nvCxnSpPr>
+          <p:spPr>
+            <a:xfrm>
+              <a:off x="5218356" y="3946521"/>
+              <a:ext cx="3180639" cy="0"/>
+            </a:xfrm>
+            <a:prstGeom prst="straightConnector1">
+              <a:avLst/>
+            </a:prstGeom>
+            <a:ln w="31750">
+              <a:solidFill>
+                <a:schemeClr val="tx1"/>
+              </a:solidFill>
+              <a:tailEnd type="arrow" w="lg" len="lg"/>
+            </a:ln>
+          </p:spPr>
+          <p:style>
+            <a:lnRef idx="1">
+              <a:schemeClr val="accent1"/>
+            </a:lnRef>
+            <a:fillRef idx="0">
+              <a:schemeClr val="accent1"/>
+            </a:fillRef>
+            <a:effectRef idx="0">
+              <a:schemeClr val="accent1"/>
+            </a:effectRef>
+            <a:fontRef idx="minor">
+              <a:schemeClr val="tx1"/>
+            </a:fontRef>
+          </p:style>
+        </p:cxnSp>
+        <p:sp>
+          <p:nvSpPr>
+            <p:cNvPr id="19" name="Rectangle 18">
+              <a:extLst>
+                <a:ext uri="{FF2B5EF4-FFF2-40B4-BE49-F238E27FC236}">
+                  <a16:creationId xmlns:a16="http://schemas.microsoft.com/office/drawing/2014/main" id="{875DE4CB-A6E6-1D25-07A1-06577C926098}"/>
+                </a:ext>
+              </a:extLst>
+            </p:cNvPr>
+            <p:cNvSpPr/>
+            <p:nvPr/>
+          </p:nvSpPr>
+          <p:spPr>
+            <a:xfrm>
+              <a:off x="1215350" y="3622521"/>
+              <a:ext cx="1122740" cy="648000"/>
+            </a:xfrm>
+            <a:prstGeom prst="rect">
+              <a:avLst/>
+            </a:prstGeom>
             <a:solidFill>
+              <a:srgbClr val="7030A0"/>
+            </a:solidFill>
+          </p:spPr>
+          <p:style>
+            <a:lnRef idx="2">
+              <a:schemeClr val="accent1">
+                <a:shade val="50000"/>
+              </a:schemeClr>
+            </a:lnRef>
+            <a:fillRef idx="1">
+              <a:schemeClr val="accent1"/>
+            </a:fillRef>
+            <a:effectRef idx="0">
+              <a:schemeClr val="accent1"/>
+            </a:effectRef>
+            <a:fontRef idx="minor">
+              <a:schemeClr val="lt1"/>
+            </a:fontRef>
+          </p:style>
+          <p:txBody>
+            <a:bodyPr rtlCol="0" anchor="ctr"/>
+            <a:lstStyle/>
+            <a:p>
+              <a:pPr algn="ctr"/>
+              <a:r>
+                <a:rPr lang="en-GB" dirty="0"/>
+                <a:t>Noise</a:t>
+              </a:r>
+            </a:p>
+            <a:p>
+              <a:pPr algn="ctr"/>
+              <a:r>
+                <a:rPr lang="en-GB" dirty="0"/>
+                <a:t>burst</a:t>
+              </a:r>
+            </a:p>
+          </p:txBody>
+        </p:sp>
+        <p:cxnSp>
+          <p:nvCxnSpPr>
+            <p:cNvPr id="20" name="Straight Arrow Connector 19">
+              <a:extLst>
+                <a:ext uri="{FF2B5EF4-FFF2-40B4-BE49-F238E27FC236}">
+                  <a16:creationId xmlns:a16="http://schemas.microsoft.com/office/drawing/2014/main" id="{2393166B-F984-CEAD-89AD-7F4C406D5236}"/>
+                </a:ext>
+              </a:extLst>
+            </p:cNvPr>
+            <p:cNvCxnSpPr>
+              <a:cxnSpLocks/>
+              <a:stCxn id="19" idx="3"/>
+              <a:endCxn id="8" idx="1"/>
+            </p:cNvCxnSpPr>
+            <p:nvPr/>
+          </p:nvCxnSpPr>
+          <p:spPr>
+            <a:xfrm>
+              <a:off x="2338090" y="3946521"/>
+              <a:ext cx="641323" cy="0"/>
+            </a:xfrm>
+            <a:prstGeom prst="straightConnector1">
+              <a:avLst/>
+            </a:prstGeom>
+            <a:ln w="31750">
+              <a:solidFill>
+                <a:schemeClr val="tx1"/>
+              </a:solidFill>
+              <a:tailEnd type="arrow" w="lg" len="lg"/>
+            </a:ln>
+          </p:spPr>
+          <p:style>
+            <a:lnRef idx="1">
+              <a:schemeClr val="accent1"/>
+            </a:lnRef>
+            <a:fillRef idx="0">
+              <a:schemeClr val="accent1"/>
+            </a:fillRef>
+            <a:effectRef idx="0">
+              <a:schemeClr val="accent1"/>
+            </a:effectRef>
+            <a:fontRef idx="minor">
               <a:schemeClr val="tx1"/>
+            </a:fontRef>
+          </p:style>
+        </p:cxnSp>
+        <p:sp>
+          <p:nvSpPr>
+            <p:cNvPr id="22" name="Rectangle 21">
+              <a:extLst>
+                <a:ext uri="{FF2B5EF4-FFF2-40B4-BE49-F238E27FC236}">
+                  <a16:creationId xmlns:a16="http://schemas.microsoft.com/office/drawing/2014/main" id="{F0258842-9D83-3B98-6325-83CFFD82DFFC}"/>
+                </a:ext>
+              </a:extLst>
+            </p:cNvPr>
+            <p:cNvSpPr/>
+            <p:nvPr/>
+          </p:nvSpPr>
+          <p:spPr>
+            <a:xfrm>
+              <a:off x="7446661" y="2393600"/>
+              <a:ext cx="894904" cy="648000"/>
+            </a:xfrm>
+            <a:prstGeom prst="rect">
+              <a:avLst/>
+            </a:prstGeom>
+            <a:solidFill>
+              <a:srgbClr val="7030A0"/>
             </a:solidFill>
-            <a:tailEnd type="arrow" w="lg" len="lg"/>
-          </a:ln>
-        </p:spPr>
-        <p:style>
-          <a:lnRef idx="1">
-            <a:schemeClr val="accent1"/>
-          </a:lnRef>
-          <a:fillRef idx="0">
-            <a:schemeClr val="accent1"/>
-          </a:fillRef>
-          <a:effectRef idx="0">
-            <a:schemeClr val="accent1"/>
-          </a:effectRef>
-          <a:fontRef idx="minor">
-            <a:schemeClr val="tx1"/>
-          </a:fontRef>
-        </p:style>
-      </p:cxnSp>
-      <p:cxnSp>
-        <p:nvCxnSpPr>
-          <p:cNvPr id="14" name="Straight Arrow Connector 13">
-            <a:extLst>
-              <a:ext uri="{FF2B5EF4-FFF2-40B4-BE49-F238E27FC236}">
-                <a16:creationId xmlns:a16="http://schemas.microsoft.com/office/drawing/2014/main" id="{6CA2D6D4-8101-C31B-E123-3862103EBF6E}"/>
-              </a:ext>
-            </a:extLst>
-          </p:cNvPr>
-          <p:cNvCxnSpPr>
-            <a:cxnSpLocks/>
-            <a:endCxn id="22" idx="2"/>
-          </p:cNvCxnSpPr>
-          <p:nvPr/>
-        </p:nvCxnSpPr>
-        <p:spPr>
-          <a:xfrm flipV="1">
-            <a:off x="7894113" y="3041600"/>
-            <a:ext cx="0" cy="904919"/>
-          </a:xfrm>
-          <a:prstGeom prst="straightConnector1">
-            <a:avLst/>
-          </a:prstGeom>
-          <a:ln w="31750">
-            <a:solidFill>
+          </p:spPr>
+          <p:style>
+            <a:lnRef idx="2">
+              <a:schemeClr val="accent1">
+                <a:shade val="50000"/>
+              </a:schemeClr>
+            </a:lnRef>
+            <a:fillRef idx="1">
+              <a:schemeClr val="accent1"/>
+            </a:fillRef>
+            <a:effectRef idx="0">
+              <a:schemeClr val="accent1"/>
+            </a:effectRef>
+            <a:fontRef idx="minor">
+              <a:schemeClr val="lt1"/>
+            </a:fontRef>
+          </p:style>
+          <p:txBody>
+            <a:bodyPr rtlCol="0" anchor="ctr"/>
+            <a:lstStyle/>
+            <a:p>
+              <a:pPr algn="ctr"/>
+              <a:r>
+                <a:rPr lang="en-GB" dirty="0"/>
+                <a:t>Delay</a:t>
+              </a:r>
+            </a:p>
+          </p:txBody>
+        </p:sp>
+        <p:cxnSp>
+          <p:nvCxnSpPr>
+            <p:cNvPr id="23" name="Straight Arrow Connector 22">
+              <a:extLst>
+                <a:ext uri="{FF2B5EF4-FFF2-40B4-BE49-F238E27FC236}">
+                  <a16:creationId xmlns:a16="http://schemas.microsoft.com/office/drawing/2014/main" id="{106AF0D4-0CD4-4EBB-E52E-C99FEA52B677}"/>
+                </a:ext>
+              </a:extLst>
+            </p:cNvPr>
+            <p:cNvCxnSpPr>
+              <a:cxnSpLocks/>
+              <a:stCxn id="22" idx="1"/>
+            </p:cNvCxnSpPr>
+            <p:nvPr/>
+          </p:nvCxnSpPr>
+          <p:spPr>
+            <a:xfrm flipH="1">
+              <a:off x="6978686" y="2717600"/>
+              <a:ext cx="467975" cy="0"/>
+            </a:xfrm>
+            <a:prstGeom prst="straightConnector1">
+              <a:avLst/>
+            </a:prstGeom>
+            <a:ln w="31750">
+              <a:solidFill>
+                <a:schemeClr val="tx1"/>
+              </a:solidFill>
+              <a:tailEnd type="arrow" w="lg" len="lg"/>
+            </a:ln>
+          </p:spPr>
+          <p:style>
+            <a:lnRef idx="1">
+              <a:schemeClr val="accent1"/>
+            </a:lnRef>
+            <a:fillRef idx="0">
+              <a:schemeClr val="accent1"/>
+            </a:fillRef>
+            <a:effectRef idx="0">
+              <a:schemeClr val="accent1"/>
+            </a:effectRef>
+            <a:fontRef idx="minor">
               <a:schemeClr val="tx1"/>
-            </a:solidFill>
-            <a:tailEnd type="arrow" w="lg" len="lg"/>
-          </a:ln>
-        </p:spPr>
-        <p:style>
-          <a:lnRef idx="1">
-            <a:schemeClr val="accent1"/>
-          </a:lnRef>
-          <a:fillRef idx="0">
-            <a:schemeClr val="accent1"/>
-          </a:fillRef>
-          <a:effectRef idx="0">
-            <a:schemeClr val="accent1"/>
-          </a:effectRef>
-          <a:fontRef idx="minor">
-            <a:schemeClr val="tx1"/>
-          </a:fontRef>
-        </p:style>
-      </p:cxnSp>
-      <p:cxnSp>
-        <p:nvCxnSpPr>
-          <p:cNvPr id="15" name="Straight Arrow Connector 14">
-            <a:extLst>
-              <a:ext uri="{FF2B5EF4-FFF2-40B4-BE49-F238E27FC236}">
-                <a16:creationId xmlns:a16="http://schemas.microsoft.com/office/drawing/2014/main" id="{53D14D3D-1A10-DEA6-230D-5D42A8C50CD6}"/>
-              </a:ext>
-            </a:extLst>
-          </p:cNvPr>
-          <p:cNvCxnSpPr>
-            <a:cxnSpLocks/>
-            <a:stCxn id="10" idx="2"/>
-            <a:endCxn id="16" idx="0"/>
-          </p:cNvCxnSpPr>
-          <p:nvPr/>
-        </p:nvCxnSpPr>
-        <p:spPr>
-          <a:xfrm flipH="1">
-            <a:off x="4948356" y="3041600"/>
-            <a:ext cx="8852" cy="634921"/>
-          </a:xfrm>
-          <a:prstGeom prst="straightConnector1">
-            <a:avLst/>
-          </a:prstGeom>
-          <a:ln w="31750">
-            <a:solidFill>
-              <a:schemeClr val="tx1"/>
-            </a:solidFill>
-            <a:tailEnd type="arrow" w="lg" len="lg"/>
-          </a:ln>
-        </p:spPr>
-        <p:style>
-          <a:lnRef idx="1">
-            <a:schemeClr val="accent1"/>
-          </a:lnRef>
-          <a:fillRef idx="0">
-            <a:schemeClr val="accent1"/>
-          </a:fillRef>
-          <a:effectRef idx="0">
-            <a:schemeClr val="accent1"/>
-          </a:effectRef>
-          <a:fontRef idx="minor">
-            <a:schemeClr val="tx1"/>
-          </a:fontRef>
-        </p:style>
-      </p:cxnSp>
-      <p:sp>
-        <p:nvSpPr>
-          <p:cNvPr id="16" name="Oval 15">
-            <a:extLst>
-              <a:ext uri="{FF2B5EF4-FFF2-40B4-BE49-F238E27FC236}">
-                <a16:creationId xmlns:a16="http://schemas.microsoft.com/office/drawing/2014/main" id="{FEA53039-A3DB-31C0-15B9-B21868D43CCD}"/>
-              </a:ext>
-            </a:extLst>
-          </p:cNvPr>
-          <p:cNvSpPr/>
-          <p:nvPr/>
-        </p:nvSpPr>
-        <p:spPr>
-          <a:xfrm>
-            <a:off x="4678356" y="3676521"/>
-            <a:ext cx="540000" cy="540000"/>
-          </a:xfrm>
-          <a:prstGeom prst="ellipse">
-            <a:avLst/>
-          </a:prstGeom>
-          <a:solidFill>
-            <a:srgbClr val="7030A0"/>
-          </a:solidFill>
-          <a:ln w="31750"/>
-        </p:spPr>
-        <p:style>
-          <a:lnRef idx="2">
-            <a:schemeClr val="accent1">
-              <a:shade val="50000"/>
-            </a:schemeClr>
-          </a:lnRef>
-          <a:fillRef idx="1">
-            <a:schemeClr val="accent1"/>
-          </a:fillRef>
-          <a:effectRef idx="0">
-            <a:schemeClr val="accent1"/>
-          </a:effectRef>
-          <a:fontRef idx="minor">
-            <a:schemeClr val="lt1"/>
-          </a:fontRef>
-        </p:style>
-        <p:txBody>
-          <a:bodyPr rtlCol="0" anchor="ctr"/>
-          <a:lstStyle/>
-          <a:p>
-            <a:pPr algn="ctr"/>
-            <a:r>
-              <a:rPr lang="en-GB" sz="3600" dirty="0">
-                <a:solidFill>
-                  <a:schemeClr val="bg1"/>
-                </a:solidFill>
-              </a:rPr>
-              <a:t>+</a:t>
-            </a:r>
-          </a:p>
-        </p:txBody>
-      </p:sp>
-      <p:cxnSp>
-        <p:nvCxnSpPr>
-          <p:cNvPr id="17" name="Straight Arrow Connector 16">
-            <a:extLst>
-              <a:ext uri="{FF2B5EF4-FFF2-40B4-BE49-F238E27FC236}">
-                <a16:creationId xmlns:a16="http://schemas.microsoft.com/office/drawing/2014/main" id="{99376B45-7658-8D09-309B-FEDF0F1BBF33}"/>
-              </a:ext>
-            </a:extLst>
-          </p:cNvPr>
-          <p:cNvCxnSpPr>
-            <a:cxnSpLocks/>
-            <a:stCxn id="16" idx="6"/>
-            <a:endCxn id="11" idx="1"/>
-          </p:cNvCxnSpPr>
-          <p:nvPr/>
-        </p:nvCxnSpPr>
-        <p:spPr>
-          <a:xfrm>
-            <a:off x="5218356" y="3946521"/>
-            <a:ext cx="3180639" cy="0"/>
-          </a:xfrm>
-          <a:prstGeom prst="straightConnector1">
-            <a:avLst/>
-          </a:prstGeom>
-          <a:ln w="31750">
-            <a:solidFill>
-              <a:schemeClr val="tx1"/>
-            </a:solidFill>
-            <a:tailEnd type="arrow" w="lg" len="lg"/>
-          </a:ln>
-        </p:spPr>
-        <p:style>
-          <a:lnRef idx="1">
-            <a:schemeClr val="accent1"/>
-          </a:lnRef>
-          <a:fillRef idx="0">
-            <a:schemeClr val="accent1"/>
-          </a:fillRef>
-          <a:effectRef idx="0">
-            <a:schemeClr val="accent1"/>
-          </a:effectRef>
-          <a:fontRef idx="minor">
-            <a:schemeClr val="tx1"/>
-          </a:fontRef>
-        </p:style>
-      </p:cxnSp>
-      <p:sp>
-        <p:nvSpPr>
-          <p:cNvPr id="19" name="Rectangle 18">
-            <a:extLst>
-              <a:ext uri="{FF2B5EF4-FFF2-40B4-BE49-F238E27FC236}">
-                <a16:creationId xmlns:a16="http://schemas.microsoft.com/office/drawing/2014/main" id="{875DE4CB-A6E6-1D25-07A1-06577C926098}"/>
-              </a:ext>
-            </a:extLst>
-          </p:cNvPr>
-          <p:cNvSpPr/>
-          <p:nvPr/>
-        </p:nvSpPr>
-        <p:spPr>
-          <a:xfrm>
-            <a:off x="1215350" y="3622521"/>
-            <a:ext cx="1122740" cy="648000"/>
-          </a:xfrm>
-          <a:prstGeom prst="rect">
-            <a:avLst/>
-          </a:prstGeom>
-          <a:solidFill>
-            <a:srgbClr val="7030A0"/>
-          </a:solidFill>
-        </p:spPr>
-        <p:style>
-          <a:lnRef idx="2">
-            <a:schemeClr val="accent1">
-              <a:shade val="50000"/>
-            </a:schemeClr>
-          </a:lnRef>
-          <a:fillRef idx="1">
-            <a:schemeClr val="accent1"/>
-          </a:fillRef>
-          <a:effectRef idx="0">
-            <a:schemeClr val="accent1"/>
-          </a:effectRef>
-          <a:fontRef idx="minor">
-            <a:schemeClr val="lt1"/>
-          </a:fontRef>
-        </p:style>
-        <p:txBody>
-          <a:bodyPr rtlCol="0" anchor="ctr"/>
-          <a:lstStyle/>
-          <a:p>
-            <a:pPr algn="ctr"/>
-            <a:r>
-              <a:rPr lang="en-GB" dirty="0"/>
-              <a:t>Noise</a:t>
-            </a:r>
-          </a:p>
-          <a:p>
-            <a:pPr algn="ctr"/>
-            <a:r>
-              <a:rPr lang="en-GB" dirty="0"/>
-              <a:t>burst</a:t>
-            </a:r>
-          </a:p>
-        </p:txBody>
-      </p:sp>
-      <p:cxnSp>
-        <p:nvCxnSpPr>
-          <p:cNvPr id="20" name="Straight Arrow Connector 19">
-            <a:extLst>
-              <a:ext uri="{FF2B5EF4-FFF2-40B4-BE49-F238E27FC236}">
-                <a16:creationId xmlns:a16="http://schemas.microsoft.com/office/drawing/2014/main" id="{2393166B-F984-CEAD-89AD-7F4C406D5236}"/>
-              </a:ext>
-            </a:extLst>
-          </p:cNvPr>
-          <p:cNvCxnSpPr>
-            <a:cxnSpLocks/>
-            <a:stCxn id="19" idx="3"/>
-            <a:endCxn id="8" idx="1"/>
-          </p:cNvCxnSpPr>
-          <p:nvPr/>
-        </p:nvCxnSpPr>
-        <p:spPr>
-          <a:xfrm>
-            <a:off x="2338090" y="3946521"/>
-            <a:ext cx="641323" cy="0"/>
-          </a:xfrm>
-          <a:prstGeom prst="straightConnector1">
-            <a:avLst/>
-          </a:prstGeom>
-          <a:ln w="31750">
-            <a:solidFill>
-              <a:schemeClr val="tx1"/>
-            </a:solidFill>
-            <a:tailEnd type="arrow" w="lg" len="lg"/>
-          </a:ln>
-        </p:spPr>
-        <p:style>
-          <a:lnRef idx="1">
-            <a:schemeClr val="accent1"/>
-          </a:lnRef>
-          <a:fillRef idx="0">
-            <a:schemeClr val="accent1"/>
-          </a:fillRef>
-          <a:effectRef idx="0">
-            <a:schemeClr val="accent1"/>
-          </a:effectRef>
-          <a:fontRef idx="minor">
-            <a:schemeClr val="tx1"/>
-          </a:fontRef>
-        </p:style>
-      </p:cxnSp>
-      <p:sp>
-        <p:nvSpPr>
-          <p:cNvPr id="22" name="Rectangle 21">
-            <a:extLst>
-              <a:ext uri="{FF2B5EF4-FFF2-40B4-BE49-F238E27FC236}">
-                <a16:creationId xmlns:a16="http://schemas.microsoft.com/office/drawing/2014/main" id="{F0258842-9D83-3B98-6325-83CFFD82DFFC}"/>
-              </a:ext>
-            </a:extLst>
-          </p:cNvPr>
-          <p:cNvSpPr/>
-          <p:nvPr/>
-        </p:nvSpPr>
-        <p:spPr>
-          <a:xfrm>
-            <a:off x="7446661" y="2393600"/>
-            <a:ext cx="894904" cy="648000"/>
-          </a:xfrm>
-          <a:prstGeom prst="rect">
-            <a:avLst/>
-          </a:prstGeom>
-          <a:solidFill>
-            <a:srgbClr val="7030A0"/>
-          </a:solidFill>
-        </p:spPr>
-        <p:style>
-          <a:lnRef idx="2">
-            <a:schemeClr val="accent1">
-              <a:shade val="50000"/>
-            </a:schemeClr>
-          </a:lnRef>
-          <a:fillRef idx="1">
-            <a:schemeClr val="accent1"/>
-          </a:fillRef>
-          <a:effectRef idx="0">
-            <a:schemeClr val="accent1"/>
-          </a:effectRef>
-          <a:fontRef idx="minor">
-            <a:schemeClr val="lt1"/>
-          </a:fontRef>
-        </p:style>
-        <p:txBody>
-          <a:bodyPr rtlCol="0" anchor="ctr"/>
-          <a:lstStyle/>
-          <a:p>
-            <a:pPr algn="ctr"/>
-            <a:r>
-              <a:rPr lang="en-GB" dirty="0"/>
-              <a:t>Delay</a:t>
-            </a:r>
-          </a:p>
-        </p:txBody>
-      </p:sp>
-      <p:cxnSp>
-        <p:nvCxnSpPr>
-          <p:cNvPr id="23" name="Straight Arrow Connector 22">
-            <a:extLst>
-              <a:ext uri="{FF2B5EF4-FFF2-40B4-BE49-F238E27FC236}">
-                <a16:creationId xmlns:a16="http://schemas.microsoft.com/office/drawing/2014/main" id="{106AF0D4-0CD4-4EBB-E52E-C99FEA52B677}"/>
-              </a:ext>
-            </a:extLst>
-          </p:cNvPr>
-          <p:cNvCxnSpPr>
-            <a:cxnSpLocks/>
-            <a:stCxn id="22" idx="1"/>
-          </p:cNvCxnSpPr>
-          <p:nvPr/>
-        </p:nvCxnSpPr>
-        <p:spPr>
-          <a:xfrm flipH="1">
-            <a:off x="6978686" y="2717600"/>
-            <a:ext cx="467975" cy="0"/>
-          </a:xfrm>
-          <a:prstGeom prst="straightConnector1">
-            <a:avLst/>
-          </a:prstGeom>
-          <a:ln w="31750">
-            <a:solidFill>
-              <a:schemeClr val="tx1"/>
-            </a:solidFill>
-            <a:tailEnd type="arrow" w="lg" len="lg"/>
-          </a:ln>
-        </p:spPr>
-        <p:style>
-          <a:lnRef idx="1">
-            <a:schemeClr val="accent1"/>
-          </a:lnRef>
-          <a:fillRef idx="0">
-            <a:schemeClr val="accent1"/>
-          </a:fillRef>
-          <a:effectRef idx="0">
-            <a:schemeClr val="accent1"/>
-          </a:effectRef>
-          <a:fontRef idx="minor">
-            <a:schemeClr val="tx1"/>
-          </a:fontRef>
-        </p:style>
-      </p:cxnSp>
+            </a:fontRef>
+          </p:style>
+        </p:cxnSp>
+      </p:grpSp>
     </p:spTree>
     <p:extLst>
       <p:ext uri="{BB962C8B-B14F-4D97-AF65-F5344CB8AC3E}">

</xml_diff>